<commit_message>
extended ESN_exp06 on ENSO index: Baseline and benchmark analysis with lin. regression and CNN/LSTM model, respectively, with multiruns over increasing target lengths.
</commit_message>
<xml_diff>
--- a/ESN_exp06_ENSO_PImeeting.pptx
+++ b/ESN_exp06_ENSO_PImeeting.pptx
@@ -5,7 +5,7 @@
     <p:sldMasterId id="2147483648" r:id="rId1"/>
   </p:sldMasterIdLst>
   <p:notesMasterIdLst>
-    <p:notesMasterId r:id="rId19"/>
+    <p:notesMasterId r:id="rId20"/>
   </p:notesMasterIdLst>
   <p:sldIdLst>
     <p:sldId id="257" r:id="rId2"/>
@@ -13,18 +13,19 @@
     <p:sldId id="263" r:id="rId4"/>
     <p:sldId id="265" r:id="rId5"/>
     <p:sldId id="266" r:id="rId6"/>
-    <p:sldId id="267" r:id="rId7"/>
-    <p:sldId id="273" r:id="rId8"/>
-    <p:sldId id="275" r:id="rId9"/>
-    <p:sldId id="276" r:id="rId10"/>
-    <p:sldId id="277" r:id="rId11"/>
-    <p:sldId id="278" r:id="rId12"/>
-    <p:sldId id="279" r:id="rId13"/>
-    <p:sldId id="274" r:id="rId14"/>
-    <p:sldId id="268" r:id="rId15"/>
-    <p:sldId id="281" r:id="rId16"/>
-    <p:sldId id="280" r:id="rId17"/>
-    <p:sldId id="269" r:id="rId18"/>
+    <p:sldId id="282" r:id="rId7"/>
+    <p:sldId id="267" r:id="rId8"/>
+    <p:sldId id="273" r:id="rId9"/>
+    <p:sldId id="277" r:id="rId10"/>
+    <p:sldId id="278" r:id="rId11"/>
+    <p:sldId id="279" r:id="rId12"/>
+    <p:sldId id="275" r:id="rId13"/>
+    <p:sldId id="276" r:id="rId14"/>
+    <p:sldId id="274" r:id="rId15"/>
+    <p:sldId id="268" r:id="rId16"/>
+    <p:sldId id="281" r:id="rId17"/>
+    <p:sldId id="280" r:id="rId18"/>
+    <p:sldId id="269" r:id="rId19"/>
   </p:sldIdLst>
   <p:sldSz cx="12192000" cy="6858000"/>
   <p:notesSz cx="6858000" cy="9144000"/>
@@ -213,7 +214,7 @@
           <a:p>
             <a:fld id="{3AB76ABC-33D1-9C41-94E4-617AD2CE1B7F}" type="datetimeFigureOut">
               <a:rPr lang="de-DE" smtClean="0"/>
-              <a:t>10.03.22</a:t>
+              <a:t>11.03.22</a:t>
             </a:fld>
             <a:endParaRPr lang="de-DE"/>
           </a:p>
@@ -797,7 +798,7 @@
           <a:p>
             <a:fld id="{923DABC9-534C-8B4E-8D84-780BFD0E7F3B}" type="slidenum">
               <a:rPr lang="de-DE" smtClean="0"/>
-              <a:t>11</a:t>
+              <a:t>10</a:t>
             </a:fld>
             <a:endParaRPr lang="de-DE"/>
           </a:p>
@@ -881,7 +882,7 @@
           <a:p>
             <a:fld id="{923DABC9-534C-8B4E-8D84-780BFD0E7F3B}" type="slidenum">
               <a:rPr lang="de-DE" smtClean="0"/>
-              <a:t>12</a:t>
+              <a:t>11</a:t>
             </a:fld>
             <a:endParaRPr lang="de-DE"/>
           </a:p>
@@ -1046,7 +1047,7 @@
           <a:lstStyle/>
           <a:p>
             <a:fld id="{7BD4D8C3-7D46-0F49-B24C-EB77122FC604}" type="datetime1">
-              <a:t>10.03.22</a:t>
+              <a:t>11.03.22</a:t>
             </a:fld>
             <a:endParaRPr lang="de-DE"/>
           </a:p>
@@ -1243,7 +1244,7 @@
           <a:lstStyle/>
           <a:p>
             <a:fld id="{DB9C740B-A762-CC4F-8842-3B0709E16494}" type="datetime1">
-              <a:t>10.03.22</a:t>
+              <a:t>11.03.22</a:t>
             </a:fld>
             <a:endParaRPr lang="de-DE"/>
           </a:p>
@@ -1450,7 +1451,7 @@
           <a:lstStyle/>
           <a:p>
             <a:fld id="{B5DCEFDD-97F0-3F4E-856D-53E015FA5109}" type="datetime1">
-              <a:t>10.03.22</a:t>
+              <a:t>11.03.22</a:t>
             </a:fld>
             <a:endParaRPr lang="de-DE"/>
           </a:p>
@@ -1647,7 +1648,7 @@
           <a:lstStyle/>
           <a:p>
             <a:fld id="{B1266B10-EA18-AA4D-98CF-856740AC35F1}" type="datetime1">
-              <a:t>10.03.22</a:t>
+              <a:t>11.03.22</a:t>
             </a:fld>
             <a:endParaRPr lang="de-DE"/>
           </a:p>
@@ -1921,7 +1922,7 @@
           <a:lstStyle/>
           <a:p>
             <a:fld id="{7FCBA1CA-7E22-9747-8D35-F7D8EE0D09E4}" type="datetime1">
-              <a:t>10.03.22</a:t>
+              <a:t>11.03.22</a:t>
             </a:fld>
             <a:endParaRPr lang="de-DE"/>
           </a:p>
@@ -2185,7 +2186,7 @@
           <a:lstStyle/>
           <a:p>
             <a:fld id="{E385B954-90D5-F240-B297-4FE6A023436C}" type="datetime1">
-              <a:t>10.03.22</a:t>
+              <a:t>11.03.22</a:t>
             </a:fld>
             <a:endParaRPr lang="de-DE"/>
           </a:p>
@@ -2596,7 +2597,7 @@
           <a:lstStyle/>
           <a:p>
             <a:fld id="{132D93F8-6522-3547-A308-39305832D986}" type="datetime1">
-              <a:t>10.03.22</a:t>
+              <a:t>11.03.22</a:t>
             </a:fld>
             <a:endParaRPr lang="de-DE"/>
           </a:p>
@@ -2736,7 +2737,7 @@
           <a:lstStyle/>
           <a:p>
             <a:fld id="{2A9155E5-A07A-EF47-A0BA-443B784B7103}" type="datetime1">
-              <a:t>10.03.22</a:t>
+              <a:t>11.03.22</a:t>
             </a:fld>
             <a:endParaRPr lang="de-DE"/>
           </a:p>
@@ -2848,7 +2849,7 @@
           <a:lstStyle/>
           <a:p>
             <a:fld id="{405279BA-97B3-BC47-B977-FE53E0846046}" type="datetime1">
-              <a:t>10.03.22</a:t>
+              <a:t>11.03.22</a:t>
             </a:fld>
             <a:endParaRPr lang="de-DE"/>
           </a:p>
@@ -3158,7 +3159,7 @@
           <a:lstStyle/>
           <a:p>
             <a:fld id="{2CDFB09A-BAAD-7C43-B25A-805ABA21608B}" type="datetime1">
-              <a:t>10.03.22</a:t>
+              <a:t>11.03.22</a:t>
             </a:fld>
             <a:endParaRPr lang="de-DE"/>
           </a:p>
@@ -3445,7 +3446,7 @@
           <a:lstStyle/>
           <a:p>
             <a:fld id="{78138569-B3F3-7940-A5AE-D6935026A2BE}" type="datetime1">
-              <a:t>10.03.22</a:t>
+              <a:t>11.03.22</a:t>
             </a:fld>
             <a:endParaRPr lang="de-DE"/>
           </a:p>
@@ -3685,7 +3686,7 @@
           </a:lstStyle>
           <a:p>
             <a:fld id="{050D7DD1-F0AC-9F48-BEEF-9A8C75FA3F30}" type="datetime1">
-              <a:t>10.03.22</a:t>
+              <a:t>11.03.22</a:t>
             </a:fld>
             <a:endParaRPr lang="de-DE"/>
           </a:p>
@@ -4302,70 +4303,42 @@
           <a:chExt cx="0" cy="0"/>
         </a:xfrm>
       </p:grpSpPr>
-      <p:sp>
-        <p:nvSpPr>
-          <p:cNvPr id="6" name="Textfeld 5">
-            <a:extLst>
-              <a:ext uri="{FF2B5EF4-FFF2-40B4-BE49-F238E27FC236}">
-                <a16:creationId xmlns:a16="http://schemas.microsoft.com/office/drawing/2014/main" id="{0FDFCF38-2125-FC44-8DC7-B38812BE71CF}"/>
-              </a:ext>
-            </a:extLst>
-          </p:cNvPr>
-          <p:cNvSpPr txBox="1"/>
-          <p:nvPr/>
-        </p:nvSpPr>
-        <p:spPr>
-          <a:xfrm>
-            <a:off x="341845" y="83130"/>
-            <a:ext cx="7988523" cy="830997"/>
-          </a:xfrm>
-          <a:prstGeom prst="rect">
-            <a:avLst/>
-          </a:prstGeom>
-          <a:noFill/>
-        </p:spPr>
-        <p:txBody>
-          <a:bodyPr wrap="square" rtlCol="0">
-            <a:spAutoFit/>
-          </a:bodyPr>
-          <a:lstStyle/>
-          <a:p>
-            <a:r>
-              <a:rPr lang="de-DE" sz="2400" b="1" dirty="0"/>
-              <a:t>Fidelity check for base ESN on ENSO index</a:t>
-            </a:r>
-          </a:p>
-          <a:p>
-            <a:r>
-              <a:rPr lang="de-DE" sz="2400" dirty="0">
-                <a:solidFill>
-                  <a:srgbClr val="FF0000"/>
-                </a:solidFill>
-              </a:rPr>
-              <a:t>target_length = </a:t>
-            </a:r>
-            <a:r>
-              <a:rPr lang="de-DE" sz="2400" b="1" dirty="0">
-                <a:solidFill>
-                  <a:srgbClr val="FF0000"/>
-                </a:solidFill>
-              </a:rPr>
-              <a:t>1 month</a:t>
-            </a:r>
-            <a:endParaRPr lang="de-DE" sz="2400" b="1" baseline="30000" dirty="0">
-              <a:solidFill>
-                <a:srgbClr val="FF0000"/>
-              </a:solidFill>
-            </a:endParaRPr>
-          </a:p>
-        </p:txBody>
-      </p:sp>
       <p:pic>
         <p:nvPicPr>
-          <p:cNvPr id="3074" name="Picture 2">
-            <a:extLst>
-              <a:ext uri="{FF2B5EF4-FFF2-40B4-BE49-F238E27FC236}">
-                <a16:creationId xmlns:a16="http://schemas.microsoft.com/office/drawing/2014/main" id="{D66DD9C0-7240-C148-863F-004E5A3BA6FD}"/>
+          <p:cNvPr id="4" name="Grafik 3">
+            <a:extLst>
+              <a:ext uri="{FF2B5EF4-FFF2-40B4-BE49-F238E27FC236}">
+                <a16:creationId xmlns:a16="http://schemas.microsoft.com/office/drawing/2014/main" id="{A373366A-4974-E641-977D-37D2EADCAEF5}"/>
+              </a:ext>
+            </a:extLst>
+          </p:cNvPr>
+          <p:cNvPicPr>
+            <a:picLocks noChangeAspect="1"/>
+          </p:cNvPicPr>
+          <p:nvPr/>
+        </p:nvPicPr>
+        <p:blipFill>
+          <a:blip r:embed="rId3"/>
+          <a:stretch>
+            <a:fillRect/>
+          </a:stretch>
+        </p:blipFill>
+        <p:spPr>
+          <a:xfrm>
+            <a:off x="311151" y="2231698"/>
+            <a:ext cx="2595239" cy="2283153"/>
+          </a:xfrm>
+          <a:prstGeom prst="rect">
+            <a:avLst/>
+          </a:prstGeom>
+        </p:spPr>
+      </p:pic>
+      <p:pic>
+        <p:nvPicPr>
+          <p:cNvPr id="5126" name="Picture 6">
+            <a:extLst>
+              <a:ext uri="{FF2B5EF4-FFF2-40B4-BE49-F238E27FC236}">
+                <a16:creationId xmlns:a16="http://schemas.microsoft.com/office/drawing/2014/main" id="{14A95079-ADC4-4141-B993-47E05073BB6E}"/>
               </a:ext>
             </a:extLst>
           </p:cNvPr>
@@ -4375,7 +4348,7 @@
           <p:nvPr/>
         </p:nvPicPr>
         <p:blipFill>
-          <a:blip r:embed="rId2">
+          <a:blip r:embed="rId4">
             <a:extLst>
               <a:ext uri="{28A0092B-C50C-407E-A947-70E740481C1C}">
                 <a14:useLocalDpi xmlns:a14="http://schemas.microsoft.com/office/drawing/2010/main" val="0"/>
@@ -4389,8 +4362,8 @@
         </p:blipFill>
         <p:spPr bwMode="auto">
           <a:xfrm>
-            <a:off x="3100385" y="1605893"/>
-            <a:ext cx="8751887" cy="4639332"/>
+            <a:off x="3114671" y="1605893"/>
+            <a:ext cx="8751889" cy="4639333"/>
           </a:xfrm>
           <a:prstGeom prst="rect">
             <a:avLst/>
@@ -4407,42 +4380,121 @@
           </a:extLst>
         </p:spPr>
       </p:pic>
-      <p:pic>
-        <p:nvPicPr>
-          <p:cNvPr id="5" name="Grafik 4">
-            <a:extLst>
-              <a:ext uri="{FF2B5EF4-FFF2-40B4-BE49-F238E27FC236}">
-                <a16:creationId xmlns:a16="http://schemas.microsoft.com/office/drawing/2014/main" id="{08E8A813-63A1-124A-97AF-796E0E484018}"/>
-              </a:ext>
-            </a:extLst>
-          </p:cNvPr>
-          <p:cNvPicPr>
-            <a:picLocks noChangeAspect="1"/>
-          </p:cNvPicPr>
-          <p:nvPr/>
-        </p:nvPicPr>
-        <p:blipFill>
-          <a:blip r:embed="rId3"/>
-          <a:stretch>
-            <a:fillRect/>
-          </a:stretch>
-        </p:blipFill>
-        <p:spPr>
-          <a:xfrm>
-            <a:off x="296864" y="2287423"/>
-            <a:ext cx="2595240" cy="2283154"/>
+      <p:sp>
+        <p:nvSpPr>
+          <p:cNvPr id="6" name="Textfeld 5">
+            <a:extLst>
+              <a:ext uri="{FF2B5EF4-FFF2-40B4-BE49-F238E27FC236}">
+                <a16:creationId xmlns:a16="http://schemas.microsoft.com/office/drawing/2014/main" id="{0FDFCF38-2125-FC44-8DC7-B38812BE71CF}"/>
+              </a:ext>
+            </a:extLst>
+          </p:cNvPr>
+          <p:cNvSpPr txBox="1"/>
+          <p:nvPr/>
+        </p:nvSpPr>
+        <p:spPr>
+          <a:xfrm>
+            <a:off x="341845" y="83130"/>
+            <a:ext cx="7988523" cy="830997"/>
           </a:xfrm>
           <a:prstGeom prst="rect">
             <a:avLst/>
           </a:prstGeom>
-        </p:spPr>
-      </p:pic>
-      <p:sp>
-        <p:nvSpPr>
-          <p:cNvPr id="19" name="Oval 18">
-            <a:extLst>
-              <a:ext uri="{FF2B5EF4-FFF2-40B4-BE49-F238E27FC236}">
-                <a16:creationId xmlns:a16="http://schemas.microsoft.com/office/drawing/2014/main" id="{8B7D014A-64E3-154D-B649-B8B8B2992827}"/>
+          <a:noFill/>
+        </p:spPr>
+        <p:txBody>
+          <a:bodyPr wrap="square" rtlCol="0">
+            <a:spAutoFit/>
+          </a:bodyPr>
+          <a:lstStyle/>
+          <a:p>
+            <a:r>
+              <a:rPr lang="de-DE" sz="2400" b="1" dirty="0"/>
+              <a:t>Fidelity check for base ESN on ENSO index</a:t>
+            </a:r>
+            <a:r>
+              <a:rPr lang="de-DE" sz="2400" dirty="0"/>
+              <a:t>*</a:t>
+            </a:r>
+            <a:r>
+              <a:rPr lang="de-DE" sz="2400" baseline="30000" dirty="0"/>
+              <a:t>)</a:t>
+            </a:r>
+          </a:p>
+          <a:p>
+            <a:r>
+              <a:rPr lang="de-DE" sz="2400" dirty="0">
+                <a:solidFill>
+                  <a:srgbClr val="FF0000"/>
+                </a:solidFill>
+              </a:rPr>
+              <a:t>target_length = </a:t>
+            </a:r>
+            <a:r>
+              <a:rPr lang="de-DE" sz="2400" b="1" dirty="0">
+                <a:solidFill>
+                  <a:srgbClr val="FF0000"/>
+                </a:solidFill>
+              </a:rPr>
+              <a:t>3 months</a:t>
+            </a:r>
+            <a:endParaRPr lang="de-DE" sz="2400" b="1" baseline="30000" dirty="0">
+              <a:solidFill>
+                <a:srgbClr val="FF0000"/>
+              </a:solidFill>
+            </a:endParaRPr>
+          </a:p>
+        </p:txBody>
+      </p:sp>
+      <p:sp>
+        <p:nvSpPr>
+          <p:cNvPr id="12" name="Textfeld 11">
+            <a:extLst>
+              <a:ext uri="{FF2B5EF4-FFF2-40B4-BE49-F238E27FC236}">
+                <a16:creationId xmlns:a16="http://schemas.microsoft.com/office/drawing/2014/main" id="{919ED181-7C4E-364A-8F1F-223512ACC688}"/>
+              </a:ext>
+            </a:extLst>
+          </p:cNvPr>
+          <p:cNvSpPr txBox="1"/>
+          <p:nvPr/>
+        </p:nvSpPr>
+        <p:spPr>
+          <a:xfrm>
+            <a:off x="9372600" y="66742"/>
+            <a:ext cx="2819401" cy="307777"/>
+          </a:xfrm>
+          <a:prstGeom prst="rect">
+            <a:avLst/>
+          </a:prstGeom>
+          <a:noFill/>
+        </p:spPr>
+        <p:txBody>
+          <a:bodyPr wrap="square" rtlCol="0">
+            <a:spAutoFit/>
+          </a:bodyPr>
+          <a:lstStyle/>
+          <a:p>
+            <a:r>
+              <a:rPr lang="de-DE" sz="1400"/>
+              <a:t>*</a:t>
+            </a:r>
+            <a:r>
+              <a:rPr lang="de-DE" sz="1400" baseline="30000"/>
+              <a:t>)</a:t>
+            </a:r>
+            <a:r>
+              <a:rPr lang="de-DE" sz="1400"/>
+              <a:t> scaled inputs for stability reasons</a:t>
+            </a:r>
+          </a:p>
+        </p:txBody>
+      </p:sp>
+      <p:sp>
+        <p:nvSpPr>
+          <p:cNvPr id="13" name="Oval 12">
+            <a:extLst>
+              <a:ext uri="{FF2B5EF4-FFF2-40B4-BE49-F238E27FC236}">
+                <a16:creationId xmlns:a16="http://schemas.microsoft.com/office/drawing/2014/main" id="{230C8DF7-208A-E147-987C-01E5FD8856E3}"/>
               </a:ext>
             </a:extLst>
           </p:cNvPr>
@@ -4493,7 +4545,7 @@
     </p:spTree>
     <p:extLst>
       <p:ext uri="{BB962C8B-B14F-4D97-AF65-F5344CB8AC3E}">
-        <p14:creationId xmlns:p14="http://schemas.microsoft.com/office/powerpoint/2010/main" val="641560152"/>
+        <p14:creationId xmlns:p14="http://schemas.microsoft.com/office/powerpoint/2010/main" val="2989734587"/>
       </p:ext>
     </p:extLst>
   </p:cSld>
@@ -4522,40 +4574,10 @@
       </p:grpSpPr>
       <p:pic>
         <p:nvPicPr>
-          <p:cNvPr id="4" name="Grafik 3">
-            <a:extLst>
-              <a:ext uri="{FF2B5EF4-FFF2-40B4-BE49-F238E27FC236}">
-                <a16:creationId xmlns:a16="http://schemas.microsoft.com/office/drawing/2014/main" id="{A373366A-4974-E641-977D-37D2EADCAEF5}"/>
-              </a:ext>
-            </a:extLst>
-          </p:cNvPr>
-          <p:cNvPicPr>
-            <a:picLocks noChangeAspect="1"/>
-          </p:cNvPicPr>
-          <p:nvPr/>
-        </p:nvPicPr>
-        <p:blipFill>
-          <a:blip r:embed="rId3"/>
-          <a:stretch>
-            <a:fillRect/>
-          </a:stretch>
-        </p:blipFill>
-        <p:spPr>
-          <a:xfrm>
-            <a:off x="311151" y="2231698"/>
-            <a:ext cx="2595239" cy="2283153"/>
-          </a:xfrm>
-          <a:prstGeom prst="rect">
-            <a:avLst/>
-          </a:prstGeom>
-        </p:spPr>
-      </p:pic>
-      <p:pic>
-        <p:nvPicPr>
-          <p:cNvPr id="5126" name="Picture 6">
-            <a:extLst>
-              <a:ext uri="{FF2B5EF4-FFF2-40B4-BE49-F238E27FC236}">
-                <a16:creationId xmlns:a16="http://schemas.microsoft.com/office/drawing/2014/main" id="{14A95079-ADC4-4141-B993-47E05073BB6E}"/>
+          <p:cNvPr id="1026" name="Picture 2">
+            <a:extLst>
+              <a:ext uri="{FF2B5EF4-FFF2-40B4-BE49-F238E27FC236}">
+                <a16:creationId xmlns:a16="http://schemas.microsoft.com/office/drawing/2014/main" id="{85495736-A7CE-3D46-8D53-E92EB826BBAC}"/>
               </a:ext>
             </a:extLst>
           </p:cNvPr>
@@ -4565,7 +4587,7 @@
           <p:nvPr/>
         </p:nvPicPr>
         <p:blipFill>
-          <a:blip r:embed="rId4">
+          <a:blip r:embed="rId3">
             <a:extLst>
               <a:ext uri="{28A0092B-C50C-407E-A947-70E740481C1C}">
                 <a14:useLocalDpi xmlns:a14="http://schemas.microsoft.com/office/drawing/2010/main" val="0"/>
@@ -4579,8 +4601,8 @@
         </p:blipFill>
         <p:spPr bwMode="auto">
           <a:xfrm>
-            <a:off x="3114671" y="1605893"/>
-            <a:ext cx="8751889" cy="4639333"/>
+            <a:off x="3096186" y="1616796"/>
+            <a:ext cx="8784663" cy="4646892"/>
           </a:xfrm>
           <a:prstGeom prst="rect">
             <a:avLst/>
@@ -4597,6 +4619,36 @@
           </a:extLst>
         </p:spPr>
       </p:pic>
+      <p:pic>
+        <p:nvPicPr>
+          <p:cNvPr id="2" name="Grafik 1">
+            <a:extLst>
+              <a:ext uri="{FF2B5EF4-FFF2-40B4-BE49-F238E27FC236}">
+                <a16:creationId xmlns:a16="http://schemas.microsoft.com/office/drawing/2014/main" id="{C35168D1-E2CD-0845-AD26-13BA86FA8F9C}"/>
+              </a:ext>
+            </a:extLst>
+          </p:cNvPr>
+          <p:cNvPicPr>
+            <a:picLocks noChangeAspect="1"/>
+          </p:cNvPicPr>
+          <p:nvPr/>
+        </p:nvPicPr>
+        <p:blipFill>
+          <a:blip r:embed="rId4"/>
+          <a:stretch>
+            <a:fillRect/>
+          </a:stretch>
+        </p:blipFill>
+        <p:spPr>
+          <a:xfrm>
+            <a:off x="311151" y="2318848"/>
+            <a:ext cx="2595238" cy="2283152"/>
+          </a:xfrm>
+          <a:prstGeom prst="rect">
+            <a:avLst/>
+          </a:prstGeom>
+        </p:spPr>
+      </p:pic>
       <p:sp>
         <p:nvSpPr>
           <p:cNvPr id="6" name="Textfeld 5">
@@ -4653,7 +4705,7 @@
                   <a:srgbClr val="FF0000"/>
                 </a:solidFill>
               </a:rPr>
-              <a:t>3 months</a:t>
+              <a:t>6 months</a:t>
             </a:r>
             <a:endParaRPr lang="de-DE" sz="2400" b="1" baseline="30000" dirty="0">
               <a:solidFill>
@@ -4708,10 +4760,10 @@
       </p:sp>
       <p:sp>
         <p:nvSpPr>
-          <p:cNvPr id="13" name="Oval 12">
-            <a:extLst>
-              <a:ext uri="{FF2B5EF4-FFF2-40B4-BE49-F238E27FC236}">
-                <a16:creationId xmlns:a16="http://schemas.microsoft.com/office/drawing/2014/main" id="{230C8DF7-208A-E147-987C-01E5FD8856E3}"/>
+          <p:cNvPr id="8" name="Oval 7">
+            <a:extLst>
+              <a:ext uri="{FF2B5EF4-FFF2-40B4-BE49-F238E27FC236}">
+                <a16:creationId xmlns:a16="http://schemas.microsoft.com/office/drawing/2014/main" id="{B2C89FA4-37EF-E549-BEDB-E22BB70460EA}"/>
               </a:ext>
             </a:extLst>
           </p:cNvPr>
@@ -4762,7 +4814,7 @@
     </p:spTree>
     <p:extLst>
       <p:ext uri="{BB962C8B-B14F-4D97-AF65-F5344CB8AC3E}">
-        <p14:creationId xmlns:p14="http://schemas.microsoft.com/office/powerpoint/2010/main" val="2989734587"/>
+        <p14:creationId xmlns:p14="http://schemas.microsoft.com/office/powerpoint/2010/main" val="94367027"/>
       </p:ext>
     </p:extLst>
   </p:cSld>
@@ -4789,12 +4841,86 @@
           <a:chExt cx="0" cy="0"/>
         </a:xfrm>
       </p:grpSpPr>
+      <p:sp>
+        <p:nvSpPr>
+          <p:cNvPr id="4" name="Foliennummernplatzhalter 3">
+            <a:extLst>
+              <a:ext uri="{FF2B5EF4-FFF2-40B4-BE49-F238E27FC236}">
+                <a16:creationId xmlns:a16="http://schemas.microsoft.com/office/drawing/2014/main" id="{9752BF9B-20ED-124C-8D78-032D3F29C212}"/>
+              </a:ext>
+            </a:extLst>
+          </p:cNvPr>
+          <p:cNvSpPr>
+            <a:spLocks noGrp="1"/>
+          </p:cNvSpPr>
+          <p:nvPr>
+            <p:ph type="sldNum" sz="quarter" idx="12"/>
+          </p:nvPr>
+        </p:nvSpPr>
+        <p:spPr/>
+        <p:txBody>
+          <a:bodyPr/>
+          <a:lstStyle/>
+          <a:p>
+            <a:fld id="{884D93BF-CEC1-484B-B797-4695C35961E3}" type="slidenum">
+              <a:rPr lang="de-DE" smtClean="0"/>
+              <a:t>12</a:t>
+            </a:fld>
+            <a:endParaRPr lang="de-DE"/>
+          </a:p>
+        </p:txBody>
+      </p:sp>
+      <p:sp>
+        <p:nvSpPr>
+          <p:cNvPr id="6" name="Textfeld 5">
+            <a:extLst>
+              <a:ext uri="{FF2B5EF4-FFF2-40B4-BE49-F238E27FC236}">
+                <a16:creationId xmlns:a16="http://schemas.microsoft.com/office/drawing/2014/main" id="{0FDFCF38-2125-FC44-8DC7-B38812BE71CF}"/>
+              </a:ext>
+            </a:extLst>
+          </p:cNvPr>
+          <p:cNvSpPr txBox="1"/>
+          <p:nvPr/>
+        </p:nvSpPr>
+        <p:spPr>
+          <a:xfrm>
+            <a:off x="341845" y="83130"/>
+            <a:ext cx="7988523" cy="830997"/>
+          </a:xfrm>
+          <a:prstGeom prst="rect">
+            <a:avLst/>
+          </a:prstGeom>
+          <a:noFill/>
+        </p:spPr>
+        <p:txBody>
+          <a:bodyPr wrap="square" rtlCol="0">
+            <a:spAutoFit/>
+          </a:bodyPr>
+          <a:lstStyle/>
+          <a:p>
+            <a:r>
+              <a:rPr lang="de-DE" sz="2400" b="1" dirty="0"/>
+              <a:t>Evaluation metrics and accuracy for base ESN on ENSO index</a:t>
+            </a:r>
+          </a:p>
+          <a:p>
+            <a:r>
+              <a:rPr lang="de-DE" sz="2400" dirty="0"/>
+              <a:t>optimized (hyper-)parameters*</a:t>
+            </a:r>
+            <a:r>
+              <a:rPr lang="de-DE" sz="2400" baseline="30000" dirty="0"/>
+              <a:t>)</a:t>
+            </a:r>
+          </a:p>
+        </p:txBody>
+      </p:sp>
       <p:pic>
         <p:nvPicPr>
-          <p:cNvPr id="1026" name="Picture 2">
-            <a:extLst>
-              <a:ext uri="{FF2B5EF4-FFF2-40B4-BE49-F238E27FC236}">
-                <a16:creationId xmlns:a16="http://schemas.microsoft.com/office/drawing/2014/main" id="{85495736-A7CE-3D46-8D53-E92EB826BBAC}"/>
+          <p:cNvPr id="1030" name="Picture 6">
+            <a:extLst>
+              <a:ext uri="{FF2B5EF4-FFF2-40B4-BE49-F238E27FC236}">
+                <a16:creationId xmlns:a16="http://schemas.microsoft.com/office/drawing/2014/main" id="{A6B501B5-7ADA-844D-B47D-4A3728B51C8B}"/>
               </a:ext>
             </a:extLst>
           </p:cNvPr>
@@ -4804,7 +4930,7 @@
           <p:nvPr/>
         </p:nvPicPr>
         <p:blipFill>
-          <a:blip r:embed="rId3">
+          <a:blip r:embed="rId2">
             <a:extLst>
               <a:ext uri="{28A0092B-C50C-407E-A947-70E740481C1C}">
                 <a14:useLocalDpi xmlns:a14="http://schemas.microsoft.com/office/drawing/2010/main" val="0"/>
@@ -4818,8 +4944,8 @@
         </p:blipFill>
         <p:spPr bwMode="auto">
           <a:xfrm>
-            <a:off x="3096186" y="1616796"/>
-            <a:ext cx="8784663" cy="4646892"/>
+            <a:off x="5177482" y="1125522"/>
+            <a:ext cx="6524565" cy="5697619"/>
           </a:xfrm>
           <a:prstGeom prst="rect">
             <a:avLst/>
@@ -4838,40 +4964,57 @@
       </p:pic>
       <p:pic>
         <p:nvPicPr>
-          <p:cNvPr id="2" name="Grafik 1">
-            <a:extLst>
-              <a:ext uri="{FF2B5EF4-FFF2-40B4-BE49-F238E27FC236}">
-                <a16:creationId xmlns:a16="http://schemas.microsoft.com/office/drawing/2014/main" id="{C35168D1-E2CD-0845-AD26-13BA86FA8F9C}"/>
+          <p:cNvPr id="1032" name="Picture 8">
+            <a:extLst>
+              <a:ext uri="{FF2B5EF4-FFF2-40B4-BE49-F238E27FC236}">
+                <a16:creationId xmlns:a16="http://schemas.microsoft.com/office/drawing/2014/main" id="{6779A9E9-B3C9-6548-BB6B-7960F593A475}"/>
               </a:ext>
             </a:extLst>
           </p:cNvPr>
           <p:cNvPicPr>
-            <a:picLocks noChangeAspect="1"/>
+            <a:picLocks noChangeAspect="1" noChangeArrowheads="1"/>
           </p:cNvPicPr>
           <p:nvPr/>
         </p:nvPicPr>
         <p:blipFill>
-          <a:blip r:embed="rId4"/>
+          <a:blip r:embed="rId3">
+            <a:extLst>
+              <a:ext uri="{28A0092B-C50C-407E-A947-70E740481C1C}">
+                <a14:useLocalDpi xmlns:a14="http://schemas.microsoft.com/office/drawing/2010/main" val="0"/>
+              </a:ext>
+            </a:extLst>
+          </a:blip>
+          <a:srcRect/>
           <a:stretch>
             <a:fillRect/>
           </a:stretch>
         </p:blipFill>
-        <p:spPr>
-          <a:xfrm>
-            <a:off x="311151" y="2318848"/>
-            <a:ext cx="2595238" cy="2283152"/>
+        <p:spPr bwMode="auto">
+          <a:xfrm>
+            <a:off x="0" y="1090664"/>
+            <a:ext cx="4930992" cy="5732477"/>
           </a:xfrm>
           <a:prstGeom prst="rect">
             <a:avLst/>
           </a:prstGeom>
+          <a:noFill/>
+          <a:extLst>
+            <a:ext uri="{909E8E84-426E-40DD-AFC4-6F175D3DCCD1}">
+              <a14:hiddenFill xmlns:a14="http://schemas.microsoft.com/office/drawing/2010/main">
+                <a:solidFill>
+                  <a:srgbClr val="FFFFFF"/>
+                </a:solidFill>
+              </a14:hiddenFill>
+            </a:ext>
+          </a:extLst>
         </p:spPr>
       </p:pic>
       <p:sp>
         <p:nvSpPr>
-          <p:cNvPr id="6" name="Textfeld 5">
-            <a:extLst>
-              <a:ext uri="{FF2B5EF4-FFF2-40B4-BE49-F238E27FC236}">
-                <a16:creationId xmlns:a16="http://schemas.microsoft.com/office/drawing/2014/main" id="{0FDFCF38-2125-FC44-8DC7-B38812BE71CF}"/>
+          <p:cNvPr id="3" name="Textfeld 2">
+            <a:extLst>
+              <a:ext uri="{FF2B5EF4-FFF2-40B4-BE49-F238E27FC236}">
+                <a16:creationId xmlns:a16="http://schemas.microsoft.com/office/drawing/2014/main" id="{CEEB9F21-C237-B747-B3F7-9F39D06967DE}"/>
               </a:ext>
             </a:extLst>
           </p:cNvPr>
@@ -4880,8 +5023,8 @@
         </p:nvSpPr>
         <p:spPr>
           <a:xfrm>
-            <a:off x="341845" y="83130"/>
-            <a:ext cx="7988523" cy="830997"/>
+            <a:off x="10538255" y="66742"/>
+            <a:ext cx="1653746" cy="307777"/>
           </a:xfrm>
           <a:prstGeom prst="rect">
             <a:avLst/>
@@ -4895,72 +5038,6 @@
           <a:lstStyle/>
           <a:p>
             <a:r>
-              <a:rPr lang="de-DE" sz="2400" b="1" dirty="0"/>
-              <a:t>Fidelity check for base ESN on ENSO index</a:t>
-            </a:r>
-            <a:r>
-              <a:rPr lang="de-DE" sz="2400" dirty="0"/>
-              <a:t>*</a:t>
-            </a:r>
-            <a:r>
-              <a:rPr lang="de-DE" sz="2400" baseline="30000" dirty="0"/>
-              <a:t>)</a:t>
-            </a:r>
-          </a:p>
-          <a:p>
-            <a:r>
-              <a:rPr lang="de-DE" sz="2400" dirty="0">
-                <a:solidFill>
-                  <a:srgbClr val="FF0000"/>
-                </a:solidFill>
-              </a:rPr>
-              <a:t>target_length = </a:t>
-            </a:r>
-            <a:r>
-              <a:rPr lang="de-DE" sz="2400" b="1" dirty="0">
-                <a:solidFill>
-                  <a:srgbClr val="FF0000"/>
-                </a:solidFill>
-              </a:rPr>
-              <a:t>6 months</a:t>
-            </a:r>
-            <a:endParaRPr lang="de-DE" sz="2400" b="1" baseline="30000" dirty="0">
-              <a:solidFill>
-                <a:srgbClr val="FF0000"/>
-              </a:solidFill>
-            </a:endParaRPr>
-          </a:p>
-        </p:txBody>
-      </p:sp>
-      <p:sp>
-        <p:nvSpPr>
-          <p:cNvPr id="12" name="Textfeld 11">
-            <a:extLst>
-              <a:ext uri="{FF2B5EF4-FFF2-40B4-BE49-F238E27FC236}">
-                <a16:creationId xmlns:a16="http://schemas.microsoft.com/office/drawing/2014/main" id="{919ED181-7C4E-364A-8F1F-223512ACC688}"/>
-              </a:ext>
-            </a:extLst>
-          </p:cNvPr>
-          <p:cNvSpPr txBox="1"/>
-          <p:nvPr/>
-        </p:nvSpPr>
-        <p:spPr>
-          <a:xfrm>
-            <a:off x="9372600" y="66742"/>
-            <a:ext cx="2819401" cy="307777"/>
-          </a:xfrm>
-          <a:prstGeom prst="rect">
-            <a:avLst/>
-          </a:prstGeom>
-          <a:noFill/>
-        </p:spPr>
-        <p:txBody>
-          <a:bodyPr wrap="square" rtlCol="0">
-            <a:spAutoFit/>
-          </a:bodyPr>
-          <a:lstStyle/>
-          <a:p>
-            <a:r>
               <a:rPr lang="de-DE" sz="1400"/>
               <a:t>*</a:t>
             </a:r>
@@ -4970,68 +5047,15 @@
             </a:r>
             <a:r>
               <a:rPr lang="de-DE" sz="1400"/>
-              <a:t> scaled inputs for stability reasons</a:t>
-            </a:r>
-          </a:p>
-        </p:txBody>
-      </p:sp>
-      <p:sp>
-        <p:nvSpPr>
-          <p:cNvPr id="8" name="Oval 7">
-            <a:extLst>
-              <a:ext uri="{FF2B5EF4-FFF2-40B4-BE49-F238E27FC236}">
-                <a16:creationId xmlns:a16="http://schemas.microsoft.com/office/drawing/2014/main" id="{B2C89FA4-37EF-E549-BEDB-E22BB70460EA}"/>
-              </a:ext>
-            </a:extLst>
-          </p:cNvPr>
-          <p:cNvSpPr/>
-          <p:nvPr/>
-        </p:nvSpPr>
-        <p:spPr>
-          <a:xfrm>
-            <a:off x="1240569" y="2593465"/>
-            <a:ext cx="1202594" cy="549786"/>
-          </a:xfrm>
-          <a:prstGeom prst="ellipse">
-            <a:avLst/>
-          </a:prstGeom>
-          <a:noFill/>
-          <a:ln w="25400">
-            <a:solidFill>
-              <a:srgbClr val="FF0000"/>
-            </a:solidFill>
-            <a:prstDash val="sysDot"/>
-          </a:ln>
-        </p:spPr>
-        <p:style>
-          <a:lnRef idx="2">
-            <a:schemeClr val="accent1">
-              <a:shade val="50000"/>
-            </a:schemeClr>
-          </a:lnRef>
-          <a:fillRef idx="1">
-            <a:schemeClr val="accent1"/>
-          </a:fillRef>
-          <a:effectRef idx="0">
-            <a:schemeClr val="accent1"/>
-          </a:effectRef>
-          <a:fontRef idx="minor">
-            <a:schemeClr val="lt1"/>
-          </a:fontRef>
-        </p:style>
-        <p:txBody>
-          <a:bodyPr rtlCol="0" anchor="ctr"/>
-          <a:lstStyle/>
-          <a:p>
-            <a:pPr algn="ctr"/>
-            <a:endParaRPr lang="de-DE"/>
+              <a:t> slightly modified</a:t>
+            </a:r>
           </a:p>
         </p:txBody>
       </p:sp>
     </p:spTree>
     <p:extLst>
       <p:ext uri="{BB962C8B-B14F-4D97-AF65-F5344CB8AC3E}">
-        <p14:creationId xmlns:p14="http://schemas.microsoft.com/office/powerpoint/2010/main" val="94367027"/>
+        <p14:creationId xmlns:p14="http://schemas.microsoft.com/office/powerpoint/2010/main" val="735687710"/>
       </p:ext>
     </p:extLst>
   </p:cSld>
@@ -5089,10 +5113,10 @@
       </p:sp>
       <p:sp>
         <p:nvSpPr>
-          <p:cNvPr id="7" name="Textfeld 6">
-            <a:extLst>
-              <a:ext uri="{FF2B5EF4-FFF2-40B4-BE49-F238E27FC236}">
-                <a16:creationId xmlns:a16="http://schemas.microsoft.com/office/drawing/2014/main" id="{FF8A926B-8B78-834F-BFBA-9405321487C6}"/>
+          <p:cNvPr id="6" name="Textfeld 5">
+            <a:extLst>
+              <a:ext uri="{FF2B5EF4-FFF2-40B4-BE49-F238E27FC236}">
+                <a16:creationId xmlns:a16="http://schemas.microsoft.com/office/drawing/2014/main" id="{0FDFCF38-2125-FC44-8DC7-B38812BE71CF}"/>
               </a:ext>
             </a:extLst>
           </p:cNvPr>
@@ -5101,8 +5125,8 @@
         </p:nvSpPr>
         <p:spPr>
           <a:xfrm>
-            <a:off x="365769" y="302411"/>
-            <a:ext cx="6674128" cy="461665"/>
+            <a:off x="341845" y="83130"/>
+            <a:ext cx="7988523" cy="830997"/>
           </a:xfrm>
           <a:prstGeom prst="rect">
             <a:avLst/>
@@ -5117,137 +5141,121 @@
           <a:p>
             <a:r>
               <a:rPr lang="de-DE" sz="2400" b="1" dirty="0"/>
-              <a:t>Summary and Outlook</a:t>
-            </a:r>
-          </a:p>
-        </p:txBody>
-      </p:sp>
-      <p:sp>
-        <p:nvSpPr>
-          <p:cNvPr id="5" name="Textfeld 4">
-            <a:extLst>
-              <a:ext uri="{FF2B5EF4-FFF2-40B4-BE49-F238E27FC236}">
-                <a16:creationId xmlns:a16="http://schemas.microsoft.com/office/drawing/2014/main" id="{7B349DC1-8020-704C-A9A0-4D7FFCADBAC0}"/>
-              </a:ext>
-            </a:extLst>
-          </p:cNvPr>
-          <p:cNvSpPr txBox="1"/>
-          <p:nvPr/>
-        </p:nvSpPr>
-        <p:spPr>
-          <a:xfrm>
-            <a:off x="543697" y="1112108"/>
-            <a:ext cx="8066903" cy="1754326"/>
-          </a:xfrm>
-          <a:prstGeom prst="rect">
-            <a:avLst/>
-          </a:prstGeom>
-          <a:noFill/>
-        </p:spPr>
-        <p:txBody>
-          <a:bodyPr wrap="square" rtlCol="0">
-            <a:spAutoFit/>
-          </a:bodyPr>
-          <a:lstStyle/>
-          <a:p>
-            <a:pPr marL="285750" indent="-285750">
-              <a:buFont typeface="Arial" panose="020B0604020202020204" pitchFamily="34" charset="0"/>
-              <a:buChar char="•"/>
-            </a:pPr>
-            <a:r>
-              <a:rPr lang="de-DE"/>
-              <a:t>Predicting </a:t>
-            </a:r>
-            <a:r>
-              <a:rPr lang="de-DE" b="1"/>
-              <a:t>ENSO index </a:t>
-            </a:r>
-            <a:r>
-              <a:rPr lang="de-DE"/>
-              <a:t>from its own history is </a:t>
-            </a:r>
-            <a:r>
-              <a:rPr lang="de-DE" b="1"/>
-              <a:t>limited to very short target lengths</a:t>
-            </a:r>
-            <a:r>
-              <a:rPr lang="de-DE"/>
-              <a:t>.</a:t>
-            </a:r>
-          </a:p>
-          <a:p>
-            <a:pPr marL="285750" indent="-285750">
-              <a:buFont typeface="Arial" panose="020B0604020202020204" pitchFamily="34" charset="0"/>
-              <a:buChar char="•"/>
-            </a:pPr>
-            <a:r>
-              <a:rPr lang="de-DE" b="1"/>
-              <a:t>Linear Regression, baseESN, DeepESN and CNN/LSTM </a:t>
-            </a:r>
-            <a:r>
-              <a:rPr lang="de-DE"/>
-              <a:t>all end up with similar accuracies for target length up to three months and fail for longer target lengths.</a:t>
-            </a:r>
-          </a:p>
-          <a:p>
-            <a:pPr marL="285750" indent="-285750">
-              <a:buFont typeface="Arial" panose="020B0604020202020204" pitchFamily="34" charset="0"/>
-              <a:buChar char="•"/>
-            </a:pPr>
-            <a:r>
-              <a:rPr lang="de-DE" b="1"/>
-              <a:t>Good toy example </a:t>
-            </a:r>
-            <a:r>
-              <a:rPr lang="de-DE"/>
-              <a:t>for implementing and testing (Deep)ESN functionality (including Gradient Descent optimization).</a:t>
-            </a:r>
-          </a:p>
-          <a:p>
-            <a:pPr marL="285750" indent="-285750">
-              <a:buFont typeface="Arial" panose="020B0604020202020204" pitchFamily="34" charset="0"/>
-              <a:buChar char="•"/>
-            </a:pPr>
-            <a:endParaRPr lang="de-DE"/>
+              <a:t>Evaluation metrics and accuracy for base ESN on ENSO index</a:t>
+            </a:r>
+          </a:p>
+          <a:p>
+            <a:r>
+              <a:rPr lang="de-DE" sz="2400" dirty="0"/>
+              <a:t>optimized (hyper-)parameters*</a:t>
+            </a:r>
+            <a:r>
+              <a:rPr lang="de-DE" sz="2400" baseline="30000" dirty="0"/>
+              <a:t>)</a:t>
+            </a:r>
           </a:p>
         </p:txBody>
       </p:sp>
       <p:pic>
         <p:nvPicPr>
-          <p:cNvPr id="2" name="Grafik 1">
-            <a:extLst>
-              <a:ext uri="{FF2B5EF4-FFF2-40B4-BE49-F238E27FC236}">
-                <a16:creationId xmlns:a16="http://schemas.microsoft.com/office/drawing/2014/main" id="{B87FBD57-8442-164C-B529-D284533D0198}"/>
+          <p:cNvPr id="1030" name="Picture 6">
+            <a:extLst>
+              <a:ext uri="{FF2B5EF4-FFF2-40B4-BE49-F238E27FC236}">
+                <a16:creationId xmlns:a16="http://schemas.microsoft.com/office/drawing/2014/main" id="{A6B501B5-7ADA-844D-B47D-4A3728B51C8B}"/>
               </a:ext>
             </a:extLst>
           </p:cNvPr>
           <p:cNvPicPr>
-            <a:picLocks noChangeAspect="1"/>
+            <a:picLocks noChangeAspect="1" noChangeArrowheads="1"/>
           </p:cNvPicPr>
           <p:nvPr/>
         </p:nvPicPr>
         <p:blipFill>
-          <a:blip r:embed="rId2"/>
+          <a:blip r:embed="rId2">
+            <a:extLst>
+              <a:ext uri="{28A0092B-C50C-407E-A947-70E740481C1C}">
+                <a14:useLocalDpi xmlns:a14="http://schemas.microsoft.com/office/drawing/2010/main" val="0"/>
+              </a:ext>
+            </a:extLst>
+          </a:blip>
+          <a:srcRect/>
           <a:stretch>
             <a:fillRect/>
           </a:stretch>
         </p:blipFill>
-        <p:spPr>
-          <a:xfrm>
-            <a:off x="8895321" y="914398"/>
-            <a:ext cx="3238500" cy="1676400"/>
+        <p:spPr bwMode="auto">
+          <a:xfrm>
+            <a:off x="5177482" y="1125522"/>
+            <a:ext cx="6524565" cy="5697619"/>
           </a:xfrm>
           <a:prstGeom prst="rect">
             <a:avLst/>
           </a:prstGeom>
+          <a:noFill/>
+          <a:extLst>
+            <a:ext uri="{909E8E84-426E-40DD-AFC4-6F175D3DCCD1}">
+              <a14:hiddenFill xmlns:a14="http://schemas.microsoft.com/office/drawing/2010/main">
+                <a:solidFill>
+                  <a:srgbClr val="FFFFFF"/>
+                </a:solidFill>
+              </a14:hiddenFill>
+            </a:ext>
+          </a:extLst>
         </p:spPr>
       </p:pic>
-      <p:sp>
-        <p:nvSpPr>
-          <p:cNvPr id="6" name="Textfeld 5">
-            <a:extLst>
-              <a:ext uri="{FF2B5EF4-FFF2-40B4-BE49-F238E27FC236}">
-                <a16:creationId xmlns:a16="http://schemas.microsoft.com/office/drawing/2014/main" id="{6F16BE29-7939-BF4E-9CA4-7D0C9057446A}"/>
+      <p:pic>
+        <p:nvPicPr>
+          <p:cNvPr id="1032" name="Picture 8">
+            <a:extLst>
+              <a:ext uri="{FF2B5EF4-FFF2-40B4-BE49-F238E27FC236}">
+                <a16:creationId xmlns:a16="http://schemas.microsoft.com/office/drawing/2014/main" id="{6779A9E9-B3C9-6548-BB6B-7960F593A475}"/>
+              </a:ext>
+            </a:extLst>
+          </p:cNvPr>
+          <p:cNvPicPr>
+            <a:picLocks noChangeAspect="1" noChangeArrowheads="1"/>
+          </p:cNvPicPr>
+          <p:nvPr/>
+        </p:nvPicPr>
+        <p:blipFill>
+          <a:blip r:embed="rId3">
+            <a:extLst>
+              <a:ext uri="{28A0092B-C50C-407E-A947-70E740481C1C}">
+                <a14:useLocalDpi xmlns:a14="http://schemas.microsoft.com/office/drawing/2010/main" val="0"/>
+              </a:ext>
+            </a:extLst>
+          </a:blip>
+          <a:srcRect/>
+          <a:stretch>
+            <a:fillRect/>
+          </a:stretch>
+        </p:blipFill>
+        <p:spPr bwMode="auto">
+          <a:xfrm>
+            <a:off x="0" y="1090664"/>
+            <a:ext cx="4930992" cy="5732477"/>
+          </a:xfrm>
+          <a:prstGeom prst="rect">
+            <a:avLst/>
+          </a:prstGeom>
+          <a:noFill/>
+          <a:extLst>
+            <a:ext uri="{909E8E84-426E-40DD-AFC4-6F175D3DCCD1}">
+              <a14:hiddenFill xmlns:a14="http://schemas.microsoft.com/office/drawing/2010/main">
+                <a:solidFill>
+                  <a:srgbClr val="FFFFFF"/>
+                </a:solidFill>
+              </a14:hiddenFill>
+            </a:ext>
+          </a:extLst>
+        </p:spPr>
+      </p:pic>
+      <p:sp>
+        <p:nvSpPr>
+          <p:cNvPr id="3" name="Textfeld 2">
+            <a:extLst>
+              <a:ext uri="{FF2B5EF4-FFF2-40B4-BE49-F238E27FC236}">
+                <a16:creationId xmlns:a16="http://schemas.microsoft.com/office/drawing/2014/main" id="{CEEB9F21-C237-B747-B3F7-9F39D06967DE}"/>
               </a:ext>
             </a:extLst>
           </p:cNvPr>
@@ -5256,8 +5264,8 @@
         </p:nvSpPr>
         <p:spPr>
           <a:xfrm>
-            <a:off x="543696" y="2626233"/>
-            <a:ext cx="5782963" cy="3693319"/>
+            <a:off x="10538255" y="66742"/>
+            <a:ext cx="1653746" cy="307777"/>
           </a:xfrm>
           <a:prstGeom prst="rect">
             <a:avLst/>
@@ -5270,133 +5278,27 @@
           </a:bodyPr>
           <a:lstStyle/>
           <a:p>
-            <a:endParaRPr lang="de-DE"/>
-          </a:p>
-          <a:p>
-            <a:pPr marL="285750" indent="-285750">
-              <a:buFont typeface="Arial" panose="020B0604020202020204" pitchFamily="34" charset="0"/>
-              <a:buChar char="•"/>
-            </a:pPr>
-            <a:r>
-              <a:rPr lang="de-DE" b="1"/>
-              <a:t>Need additional input features </a:t>
-            </a:r>
-            <a:r>
-              <a:rPr lang="de-DE"/>
-              <a:t>for long-term predictions and tackling similar problems.</a:t>
-            </a:r>
-          </a:p>
-          <a:p>
-            <a:pPr marL="285750" indent="-285750">
-              <a:buFont typeface="Arial" panose="020B0604020202020204" pitchFamily="34" charset="0"/>
-              <a:buChar char="•"/>
-            </a:pPr>
-            <a:r>
-              <a:rPr lang="de-DE"/>
-              <a:t>Model data from </a:t>
-            </a:r>
-            <a:r>
-              <a:rPr lang="de-DE" b="1"/>
-              <a:t>FOCI</a:t>
-            </a:r>
-            <a:r>
-              <a:rPr lang="de-DE"/>
-              <a:t> run:</a:t>
-            </a:r>
-          </a:p>
-          <a:p>
-            <a:pPr marL="742950" lvl="1" indent="-285750">
-              <a:buFont typeface="Courier New" panose="02070309020205020404" pitchFamily="49" charset="0"/>
-              <a:buChar char="o"/>
-            </a:pPr>
-            <a:r>
-              <a:rPr lang="de-DE"/>
-              <a:t>sea-surface temperature</a:t>
-            </a:r>
-          </a:p>
-          <a:p>
-            <a:pPr marL="742950" lvl="1" indent="-285750">
-              <a:buFont typeface="Courier New" panose="02070309020205020404" pitchFamily="49" charset="0"/>
-              <a:buChar char="o"/>
-            </a:pPr>
-            <a:r>
-              <a:rPr lang="de-DE"/>
-              <a:t>sea-surface pressure</a:t>
-            </a:r>
-          </a:p>
-          <a:p>
-            <a:pPr marL="742950" lvl="1" indent="-285750">
-              <a:buFont typeface="Courier New" panose="02070309020205020404" pitchFamily="49" charset="0"/>
-              <a:buChar char="o"/>
-            </a:pPr>
-            <a:r>
-              <a:rPr lang="de-DE"/>
-              <a:t>wind direction / speed (trade winds)</a:t>
-            </a:r>
-          </a:p>
-          <a:p>
-            <a:pPr marL="742950" lvl="1" indent="-285750">
-              <a:buFont typeface="Courier New" panose="02070309020205020404" pitchFamily="49" charset="0"/>
-              <a:buChar char="o"/>
-            </a:pPr>
-            <a:r>
-              <a:rPr lang="de-DE"/>
-              <a:t>precipitation / humidity</a:t>
-            </a:r>
-          </a:p>
-          <a:p>
-            <a:pPr marL="742950" lvl="1" indent="-285750">
-              <a:buFont typeface="Courier New" panose="02070309020205020404" pitchFamily="49" charset="0"/>
-              <a:buChar char="o"/>
-            </a:pPr>
-            <a:r>
-              <a:rPr lang="de-DE"/>
-              <a:t>ocean currents, upwelling / downwelling</a:t>
-            </a:r>
-          </a:p>
-          <a:p>
-            <a:pPr marL="742950" lvl="1" indent="-285750">
-              <a:buFont typeface="Courier New" panose="02070309020205020404" pitchFamily="49" charset="0"/>
-              <a:buChar char="o"/>
-            </a:pPr>
-            <a:endParaRPr lang="de-DE"/>
-          </a:p>
-          <a:p>
-            <a:pPr marL="285750" indent="-285750">
-              <a:buFont typeface="Arial" panose="020B0604020202020204" pitchFamily="34" charset="0"/>
-              <a:buChar char="•"/>
-            </a:pPr>
-            <a:r>
-              <a:rPr lang="de-DE"/>
-              <a:t>Get really </a:t>
-            </a:r>
-            <a:r>
-              <a:rPr lang="de-DE" b="1"/>
-              <a:t>long timeseries</a:t>
-            </a:r>
-            <a:r>
-              <a:rPr lang="de-DE"/>
-              <a:t>, modelling the underlying physical processes after spin-up.</a:t>
-            </a:r>
-          </a:p>
-          <a:p>
-            <a:pPr marL="285750" indent="-285750">
-              <a:buFont typeface="Arial" panose="020B0604020202020204" pitchFamily="34" charset="0"/>
-              <a:buChar char="•"/>
-            </a:pPr>
-            <a:r>
-              <a:rPr lang="de-DE"/>
-              <a:t>Use features in modular way.</a:t>
-            </a:r>
-          </a:p>
-        </p:txBody>
-      </p:sp>
-      <p:sp>
-        <p:nvSpPr>
-          <p:cNvPr id="8" name="Oval 7">
-            <a:extLst>
-              <a:ext uri="{FF2B5EF4-FFF2-40B4-BE49-F238E27FC236}">
-                <a16:creationId xmlns:a16="http://schemas.microsoft.com/office/drawing/2014/main" id="{5CFBFC3B-8649-D347-9AFA-1C62D7A9B8D8}"/>
+            <a:r>
+              <a:rPr lang="de-DE" sz="1400"/>
+              <a:t>*</a:t>
+            </a:r>
+            <a:r>
+              <a:rPr lang="de-DE" sz="1400" baseline="30000"/>
+              <a:t>)</a:t>
+            </a:r>
+            <a:r>
+              <a:rPr lang="de-DE" sz="1400"/>
+              <a:t> slightly modified</a:t>
+            </a:r>
+          </a:p>
+        </p:txBody>
+      </p:sp>
+      <p:sp>
+        <p:nvSpPr>
+          <p:cNvPr id="2" name="Oval 1">
+            <a:extLst>
+              <a:ext uri="{FF2B5EF4-FFF2-40B4-BE49-F238E27FC236}">
+                <a16:creationId xmlns:a16="http://schemas.microsoft.com/office/drawing/2014/main" id="{BB1C868E-01A4-3640-81E6-9CE23CD60717}"/>
               </a:ext>
             </a:extLst>
           </p:cNvPr>
@@ -5405,8 +5307,8 @@
         </p:nvSpPr>
         <p:spPr>
           <a:xfrm>
-            <a:off x="9816159" y="1477705"/>
-            <a:ext cx="1202594" cy="549786"/>
+            <a:off x="5437229" y="1665130"/>
+            <a:ext cx="1260390" cy="580767"/>
           </a:xfrm>
           <a:prstGeom prst="ellipse">
             <a:avLst/>
@@ -5444,40 +5346,555 @@
           </a:p>
         </p:txBody>
       </p:sp>
-      <p:pic>
-        <p:nvPicPr>
-          <p:cNvPr id="3" name="Grafik 2">
-            <a:extLst>
-              <a:ext uri="{FF2B5EF4-FFF2-40B4-BE49-F238E27FC236}">
-                <a16:creationId xmlns:a16="http://schemas.microsoft.com/office/drawing/2014/main" id="{1FD23113-79C4-014C-92BC-01FA438E2A0D}"/>
-              </a:ext>
-            </a:extLst>
-          </p:cNvPr>
-          <p:cNvPicPr>
-            <a:picLocks noChangeAspect="1"/>
-          </p:cNvPicPr>
-          <p:nvPr/>
-        </p:nvPicPr>
-        <p:blipFill>
-          <a:blip r:embed="rId3"/>
-          <a:stretch>
-            <a:fillRect/>
-          </a:stretch>
-        </p:blipFill>
-        <p:spPr>
-          <a:xfrm>
-            <a:off x="6854546" y="2957365"/>
-            <a:ext cx="4882271" cy="3431835"/>
+      <p:sp>
+        <p:nvSpPr>
+          <p:cNvPr id="8" name="Oval 7">
+            <a:extLst>
+              <a:ext uri="{FF2B5EF4-FFF2-40B4-BE49-F238E27FC236}">
+                <a16:creationId xmlns:a16="http://schemas.microsoft.com/office/drawing/2014/main" id="{94536BFD-35CF-DC44-8271-8B74723C9FA4}"/>
+              </a:ext>
+            </a:extLst>
+          </p:cNvPr>
+          <p:cNvSpPr/>
+          <p:nvPr/>
+        </p:nvSpPr>
+        <p:spPr>
+          <a:xfrm>
+            <a:off x="7600157" y="1665129"/>
+            <a:ext cx="1260390" cy="580767"/>
+          </a:xfrm>
+          <a:prstGeom prst="ellipse">
+            <a:avLst/>
+          </a:prstGeom>
+          <a:noFill/>
+          <a:ln w="25400">
+            <a:solidFill>
+              <a:srgbClr val="FF0000"/>
+            </a:solidFill>
+            <a:prstDash val="sysDot"/>
+          </a:ln>
+        </p:spPr>
+        <p:style>
+          <a:lnRef idx="2">
+            <a:schemeClr val="accent1">
+              <a:shade val="50000"/>
+            </a:schemeClr>
+          </a:lnRef>
+          <a:fillRef idx="1">
+            <a:schemeClr val="accent1"/>
+          </a:fillRef>
+          <a:effectRef idx="0">
+            <a:schemeClr val="accent1"/>
+          </a:effectRef>
+          <a:fontRef idx="minor">
+            <a:schemeClr val="lt1"/>
+          </a:fontRef>
+        </p:style>
+        <p:txBody>
+          <a:bodyPr rtlCol="0" anchor="ctr"/>
+          <a:lstStyle/>
+          <a:p>
+            <a:pPr algn="ctr"/>
+            <a:endParaRPr lang="de-DE"/>
+          </a:p>
+        </p:txBody>
+      </p:sp>
+      <p:sp>
+        <p:nvSpPr>
+          <p:cNvPr id="9" name="Oval 8">
+            <a:extLst>
+              <a:ext uri="{FF2B5EF4-FFF2-40B4-BE49-F238E27FC236}">
+                <a16:creationId xmlns:a16="http://schemas.microsoft.com/office/drawing/2014/main" id="{BD36AB9B-9C75-7B45-AD50-A1B3B033511B}"/>
+              </a:ext>
+            </a:extLst>
+          </p:cNvPr>
+          <p:cNvSpPr/>
+          <p:nvPr/>
+        </p:nvSpPr>
+        <p:spPr>
+          <a:xfrm>
+            <a:off x="5465805" y="4329863"/>
+            <a:ext cx="1260390" cy="580767"/>
+          </a:xfrm>
+          <a:prstGeom prst="ellipse">
+            <a:avLst/>
+          </a:prstGeom>
+          <a:noFill/>
+          <a:ln w="25400">
+            <a:solidFill>
+              <a:srgbClr val="FF0000"/>
+            </a:solidFill>
+            <a:prstDash val="sysDot"/>
+          </a:ln>
+        </p:spPr>
+        <p:style>
+          <a:lnRef idx="2">
+            <a:schemeClr val="accent1">
+              <a:shade val="50000"/>
+            </a:schemeClr>
+          </a:lnRef>
+          <a:fillRef idx="1">
+            <a:schemeClr val="accent1"/>
+          </a:fillRef>
+          <a:effectRef idx="0">
+            <a:schemeClr val="accent1"/>
+          </a:effectRef>
+          <a:fontRef idx="minor">
+            <a:schemeClr val="lt1"/>
+          </a:fontRef>
+        </p:style>
+        <p:txBody>
+          <a:bodyPr rtlCol="0" anchor="ctr"/>
+          <a:lstStyle/>
+          <a:p>
+            <a:pPr algn="ctr"/>
+            <a:endParaRPr lang="de-DE"/>
+          </a:p>
+        </p:txBody>
+      </p:sp>
+      <p:sp>
+        <p:nvSpPr>
+          <p:cNvPr id="10" name="Oval 9">
+            <a:extLst>
+              <a:ext uri="{FF2B5EF4-FFF2-40B4-BE49-F238E27FC236}">
+                <a16:creationId xmlns:a16="http://schemas.microsoft.com/office/drawing/2014/main" id="{B8182CB0-0350-114A-B0E7-907FCFFA57A1}"/>
+              </a:ext>
+            </a:extLst>
+          </p:cNvPr>
+          <p:cNvSpPr/>
+          <p:nvPr/>
+        </p:nvSpPr>
+        <p:spPr>
+          <a:xfrm>
+            <a:off x="7574837" y="4358439"/>
+            <a:ext cx="1260390" cy="580767"/>
+          </a:xfrm>
+          <a:prstGeom prst="ellipse">
+            <a:avLst/>
+          </a:prstGeom>
+          <a:noFill/>
+          <a:ln w="25400">
+            <a:solidFill>
+              <a:srgbClr val="FF0000"/>
+            </a:solidFill>
+            <a:prstDash val="sysDot"/>
+          </a:ln>
+        </p:spPr>
+        <p:style>
+          <a:lnRef idx="2">
+            <a:schemeClr val="accent1">
+              <a:shade val="50000"/>
+            </a:schemeClr>
+          </a:lnRef>
+          <a:fillRef idx="1">
+            <a:schemeClr val="accent1"/>
+          </a:fillRef>
+          <a:effectRef idx="0">
+            <a:schemeClr val="accent1"/>
+          </a:effectRef>
+          <a:fontRef idx="minor">
+            <a:schemeClr val="lt1"/>
+          </a:fontRef>
+        </p:style>
+        <p:txBody>
+          <a:bodyPr rtlCol="0" anchor="ctr"/>
+          <a:lstStyle/>
+          <a:p>
+            <a:pPr algn="ctr"/>
+            <a:endParaRPr lang="de-DE"/>
+          </a:p>
+        </p:txBody>
+      </p:sp>
+      <p:sp>
+        <p:nvSpPr>
+          <p:cNvPr id="11" name="Oval 10">
+            <a:extLst>
+              <a:ext uri="{FF2B5EF4-FFF2-40B4-BE49-F238E27FC236}">
+                <a16:creationId xmlns:a16="http://schemas.microsoft.com/office/drawing/2014/main" id="{52D513D3-C95F-194D-B8D0-6B8CCF7B3B09}"/>
+              </a:ext>
+            </a:extLst>
+          </p:cNvPr>
+          <p:cNvSpPr/>
+          <p:nvPr/>
+        </p:nvSpPr>
+        <p:spPr>
+          <a:xfrm>
+            <a:off x="341845" y="5993820"/>
+            <a:ext cx="1260390" cy="580767"/>
+          </a:xfrm>
+          <a:prstGeom prst="ellipse">
+            <a:avLst/>
+          </a:prstGeom>
+          <a:noFill/>
+          <a:ln w="25400">
+            <a:solidFill>
+              <a:srgbClr val="FF0000"/>
+            </a:solidFill>
+            <a:prstDash val="sysDot"/>
+          </a:ln>
+        </p:spPr>
+        <p:style>
+          <a:lnRef idx="2">
+            <a:schemeClr val="accent1">
+              <a:shade val="50000"/>
+            </a:schemeClr>
+          </a:lnRef>
+          <a:fillRef idx="1">
+            <a:schemeClr val="accent1"/>
+          </a:fillRef>
+          <a:effectRef idx="0">
+            <a:schemeClr val="accent1"/>
+          </a:effectRef>
+          <a:fontRef idx="minor">
+            <a:schemeClr val="lt1"/>
+          </a:fontRef>
+        </p:style>
+        <p:txBody>
+          <a:bodyPr rtlCol="0" anchor="ctr"/>
+          <a:lstStyle/>
+          <a:p>
+            <a:pPr algn="ctr"/>
+            <a:endParaRPr lang="de-DE"/>
+          </a:p>
+        </p:txBody>
+      </p:sp>
+      <p:sp>
+        <p:nvSpPr>
+          <p:cNvPr id="12" name="Oval 11">
+            <a:extLst>
+              <a:ext uri="{FF2B5EF4-FFF2-40B4-BE49-F238E27FC236}">
+                <a16:creationId xmlns:a16="http://schemas.microsoft.com/office/drawing/2014/main" id="{74158EB9-9261-5B45-BDC5-9E58BFB1D172}"/>
+              </a:ext>
+            </a:extLst>
+          </p:cNvPr>
+          <p:cNvSpPr/>
+          <p:nvPr/>
+        </p:nvSpPr>
+        <p:spPr>
+          <a:xfrm>
+            <a:off x="2465496" y="5993820"/>
+            <a:ext cx="1260390" cy="580767"/>
+          </a:xfrm>
+          <a:prstGeom prst="ellipse">
+            <a:avLst/>
+          </a:prstGeom>
+          <a:noFill/>
+          <a:ln w="25400">
+            <a:solidFill>
+              <a:srgbClr val="FF0000"/>
+            </a:solidFill>
+            <a:prstDash val="sysDot"/>
+          </a:ln>
+        </p:spPr>
+        <p:style>
+          <a:lnRef idx="2">
+            <a:schemeClr val="accent1">
+              <a:shade val="50000"/>
+            </a:schemeClr>
+          </a:lnRef>
+          <a:fillRef idx="1">
+            <a:schemeClr val="accent1"/>
+          </a:fillRef>
+          <a:effectRef idx="0">
+            <a:schemeClr val="accent1"/>
+          </a:effectRef>
+          <a:fontRef idx="minor">
+            <a:schemeClr val="lt1"/>
+          </a:fontRef>
+        </p:style>
+        <p:txBody>
+          <a:bodyPr rtlCol="0" anchor="ctr"/>
+          <a:lstStyle/>
+          <a:p>
+            <a:pPr algn="ctr"/>
+            <a:endParaRPr lang="de-DE"/>
+          </a:p>
+        </p:txBody>
+      </p:sp>
+      <p:sp>
+        <p:nvSpPr>
+          <p:cNvPr id="13" name="Oval 12">
+            <a:extLst>
+              <a:ext uri="{FF2B5EF4-FFF2-40B4-BE49-F238E27FC236}">
+                <a16:creationId xmlns:a16="http://schemas.microsoft.com/office/drawing/2014/main" id="{CB9EC61A-E518-1747-8039-6AB5F6F6D007}"/>
+              </a:ext>
+            </a:extLst>
+          </p:cNvPr>
+          <p:cNvSpPr/>
+          <p:nvPr/>
+        </p:nvSpPr>
+        <p:spPr>
+          <a:xfrm>
+            <a:off x="373157" y="3436357"/>
+            <a:ext cx="1260390" cy="580767"/>
+          </a:xfrm>
+          <a:prstGeom prst="ellipse">
+            <a:avLst/>
+          </a:prstGeom>
+          <a:noFill/>
+          <a:ln w="25400">
+            <a:solidFill>
+              <a:srgbClr val="FF0000"/>
+            </a:solidFill>
+            <a:prstDash val="sysDot"/>
+          </a:ln>
+        </p:spPr>
+        <p:style>
+          <a:lnRef idx="2">
+            <a:schemeClr val="accent1">
+              <a:shade val="50000"/>
+            </a:schemeClr>
+          </a:lnRef>
+          <a:fillRef idx="1">
+            <a:schemeClr val="accent1"/>
+          </a:fillRef>
+          <a:effectRef idx="0">
+            <a:schemeClr val="accent1"/>
+          </a:effectRef>
+          <a:fontRef idx="minor">
+            <a:schemeClr val="lt1"/>
+          </a:fontRef>
+        </p:style>
+        <p:txBody>
+          <a:bodyPr rtlCol="0" anchor="ctr"/>
+          <a:lstStyle/>
+          <a:p>
+            <a:pPr algn="ctr"/>
+            <a:endParaRPr lang="de-DE"/>
+          </a:p>
+        </p:txBody>
+      </p:sp>
+      <p:sp>
+        <p:nvSpPr>
+          <p:cNvPr id="14" name="Oval 13">
+            <a:extLst>
+              <a:ext uri="{FF2B5EF4-FFF2-40B4-BE49-F238E27FC236}">
+                <a16:creationId xmlns:a16="http://schemas.microsoft.com/office/drawing/2014/main" id="{A9FCBF11-FE62-2446-A010-A00E26A4D8D6}"/>
+              </a:ext>
+            </a:extLst>
+          </p:cNvPr>
+          <p:cNvSpPr/>
+          <p:nvPr/>
+        </p:nvSpPr>
+        <p:spPr>
+          <a:xfrm>
+            <a:off x="2526444" y="3393564"/>
+            <a:ext cx="1260390" cy="580767"/>
+          </a:xfrm>
+          <a:prstGeom prst="ellipse">
+            <a:avLst/>
+          </a:prstGeom>
+          <a:noFill/>
+          <a:ln w="25400">
+            <a:solidFill>
+              <a:srgbClr val="FF0000"/>
+            </a:solidFill>
+            <a:prstDash val="sysDot"/>
+          </a:ln>
+        </p:spPr>
+        <p:style>
+          <a:lnRef idx="2">
+            <a:schemeClr val="accent1">
+              <a:shade val="50000"/>
+            </a:schemeClr>
+          </a:lnRef>
+          <a:fillRef idx="1">
+            <a:schemeClr val="accent1"/>
+          </a:fillRef>
+          <a:effectRef idx="0">
+            <a:schemeClr val="accent1"/>
+          </a:effectRef>
+          <a:fontRef idx="minor">
+            <a:schemeClr val="lt1"/>
+          </a:fontRef>
+        </p:style>
+        <p:txBody>
+          <a:bodyPr rtlCol="0" anchor="ctr"/>
+          <a:lstStyle/>
+          <a:p>
+            <a:pPr algn="ctr"/>
+            <a:endParaRPr lang="de-DE"/>
+          </a:p>
+        </p:txBody>
+      </p:sp>
+      <p:sp>
+        <p:nvSpPr>
+          <p:cNvPr id="15" name="Oval 14">
+            <a:extLst>
+              <a:ext uri="{FF2B5EF4-FFF2-40B4-BE49-F238E27FC236}">
+                <a16:creationId xmlns:a16="http://schemas.microsoft.com/office/drawing/2014/main" id="{D56DBB79-26FD-5C45-8DFF-FAF9D7ED3383}"/>
+              </a:ext>
+            </a:extLst>
+          </p:cNvPr>
+          <p:cNvSpPr/>
+          <p:nvPr/>
+        </p:nvSpPr>
+        <p:spPr>
+          <a:xfrm>
+            <a:off x="9763085" y="1665128"/>
+            <a:ext cx="1260390" cy="580767"/>
+          </a:xfrm>
+          <a:prstGeom prst="ellipse">
+            <a:avLst/>
+          </a:prstGeom>
+          <a:noFill/>
+          <a:ln w="25400">
+            <a:solidFill>
+              <a:srgbClr val="FF0000"/>
+            </a:solidFill>
+            <a:prstDash val="sysDot"/>
+          </a:ln>
+        </p:spPr>
+        <p:style>
+          <a:lnRef idx="2">
+            <a:schemeClr val="accent1">
+              <a:shade val="50000"/>
+            </a:schemeClr>
+          </a:lnRef>
+          <a:fillRef idx="1">
+            <a:schemeClr val="accent1"/>
+          </a:fillRef>
+          <a:effectRef idx="0">
+            <a:schemeClr val="accent1"/>
+          </a:effectRef>
+          <a:fontRef idx="minor">
+            <a:schemeClr val="lt1"/>
+          </a:fontRef>
+        </p:style>
+        <p:txBody>
+          <a:bodyPr rtlCol="0" anchor="ctr"/>
+          <a:lstStyle/>
+          <a:p>
+            <a:pPr algn="ctr"/>
+            <a:endParaRPr lang="de-DE"/>
+          </a:p>
+        </p:txBody>
+      </p:sp>
+      <p:sp>
+        <p:nvSpPr>
+          <p:cNvPr id="16" name="Oval 15">
+            <a:extLst>
+              <a:ext uri="{FF2B5EF4-FFF2-40B4-BE49-F238E27FC236}">
+                <a16:creationId xmlns:a16="http://schemas.microsoft.com/office/drawing/2014/main" id="{F9E7C157-8AF7-FD42-87CD-AD91D8D1BE0E}"/>
+              </a:ext>
+            </a:extLst>
+          </p:cNvPr>
+          <p:cNvSpPr/>
+          <p:nvPr/>
+        </p:nvSpPr>
+        <p:spPr>
+          <a:xfrm>
+            <a:off x="9638442" y="4321722"/>
+            <a:ext cx="1260390" cy="580767"/>
+          </a:xfrm>
+          <a:prstGeom prst="ellipse">
+            <a:avLst/>
+          </a:prstGeom>
+          <a:noFill/>
+          <a:ln w="25400">
+            <a:solidFill>
+              <a:srgbClr val="FF0000"/>
+            </a:solidFill>
+            <a:prstDash val="sysDot"/>
+          </a:ln>
+        </p:spPr>
+        <p:style>
+          <a:lnRef idx="2">
+            <a:schemeClr val="accent1">
+              <a:shade val="50000"/>
+            </a:schemeClr>
+          </a:lnRef>
+          <a:fillRef idx="1">
+            <a:schemeClr val="accent1"/>
+          </a:fillRef>
+          <a:effectRef idx="0">
+            <a:schemeClr val="accent1"/>
+          </a:effectRef>
+          <a:fontRef idx="minor">
+            <a:schemeClr val="lt1"/>
+          </a:fontRef>
+        </p:style>
+        <p:txBody>
+          <a:bodyPr rtlCol="0" anchor="ctr"/>
+          <a:lstStyle/>
+          <a:p>
+            <a:pPr algn="ctr"/>
+            <a:endParaRPr lang="de-DE"/>
+          </a:p>
+        </p:txBody>
+      </p:sp>
+      <p:sp>
+        <p:nvSpPr>
+          <p:cNvPr id="17" name="Textfeld 16">
+            <a:extLst>
+              <a:ext uri="{FF2B5EF4-FFF2-40B4-BE49-F238E27FC236}">
+                <a16:creationId xmlns:a16="http://schemas.microsoft.com/office/drawing/2014/main" id="{5097CE70-2AE0-1F47-A386-CFA4F6F26EC6}"/>
+              </a:ext>
+            </a:extLst>
+          </p:cNvPr>
+          <p:cNvSpPr txBox="1"/>
+          <p:nvPr/>
+        </p:nvSpPr>
+        <p:spPr>
+          <a:xfrm>
+            <a:off x="5946501" y="582918"/>
+            <a:ext cx="5755546" cy="400110"/>
           </a:xfrm>
           <a:prstGeom prst="rect">
             <a:avLst/>
           </a:prstGeom>
-        </p:spPr>
-      </p:pic>
+          <a:solidFill>
+            <a:schemeClr val="bg2"/>
+          </a:solidFill>
+        </p:spPr>
+        <p:txBody>
+          <a:bodyPr wrap="square" rtlCol="0">
+            <a:spAutoFit/>
+          </a:bodyPr>
+          <a:lstStyle/>
+          <a:p>
+            <a:r>
+              <a:rPr lang="de-DE" sz="2000">
+                <a:solidFill>
+                  <a:srgbClr val="FF0000"/>
+                </a:solidFill>
+                <a:sym typeface="Wingdings" pitchFamily="2" charset="2"/>
+              </a:rPr>
+              <a:t> Works fine for </a:t>
+            </a:r>
+            <a:r>
+              <a:rPr lang="de-DE" sz="2000" b="1">
+                <a:solidFill>
+                  <a:srgbClr val="FF0000"/>
+                </a:solidFill>
+                <a:sym typeface="Wingdings" pitchFamily="2" charset="2"/>
+              </a:rPr>
+              <a:t>short target length </a:t>
+            </a:r>
+            <a:r>
+              <a:rPr lang="de-DE" sz="2000">
+                <a:solidFill>
+                  <a:srgbClr val="FF0000"/>
+                </a:solidFill>
+                <a:sym typeface="Wingdings" pitchFamily="2" charset="2"/>
+              </a:rPr>
+              <a:t>up to 3 months</a:t>
+            </a:r>
+            <a:r>
+              <a:rPr lang="de-DE" sz="2000">
+                <a:solidFill>
+                  <a:srgbClr val="FF0000"/>
+                </a:solidFill>
+              </a:rPr>
+              <a:t>!</a:t>
+            </a:r>
+          </a:p>
+        </p:txBody>
+      </p:sp>
     </p:spTree>
     <p:extLst>
       <p:ext uri="{BB962C8B-B14F-4D97-AF65-F5344CB8AC3E}">
-        <p14:creationId xmlns:p14="http://schemas.microsoft.com/office/powerpoint/2010/main" val="781926011"/>
+        <p14:creationId xmlns:p14="http://schemas.microsoft.com/office/powerpoint/2010/main" val="2488459674"/>
       </p:ext>
     </p:extLst>
   </p:cSld>
@@ -5563,7 +5980,7 @@
           <a:p>
             <a:r>
               <a:rPr lang="de-DE" sz="2400" b="1" dirty="0"/>
-              <a:t>Discussion on Gradient Descent Optimization</a:t>
+              <a:t>Summary and Outlook</a:t>
             </a:r>
           </a:p>
         </p:txBody>
@@ -5583,7 +6000,7 @@
         <p:spPr>
           <a:xfrm>
             <a:off x="543697" y="1112108"/>
-            <a:ext cx="10600553" cy="5078313"/>
+            <a:ext cx="8066903" cy="1754326"/>
           </a:xfrm>
           <a:prstGeom prst="rect">
             <a:avLst/>
@@ -5601,12 +6018,24 @@
               <a:buChar char="•"/>
             </a:pPr>
             <a:r>
+              <a:rPr lang="de-DE"/>
+              <a:t>Predicting </a:t>
+            </a:r>
+            <a:r>
               <a:rPr lang="de-DE" b="1"/>
-              <a:t>Very fast </a:t>
+              <a:t>ENSO index </a:t>
             </a:r>
             <a:r>
               <a:rPr lang="de-DE"/>
-              <a:t>optimization (compared to gridsearch over ALL possible parameter combinations).</a:t>
+              <a:t>from its own history is </a:t>
+            </a:r>
+            <a:r>
+              <a:rPr lang="de-DE" b="1"/>
+              <a:t>limited to very short target lengths</a:t>
+            </a:r>
+            <a:r>
+              <a:rPr lang="de-DE"/>
+              <a:t>.</a:t>
             </a:r>
           </a:p>
           <a:p>
@@ -5615,48 +6044,12 @@
               <a:buChar char="•"/>
             </a:pPr>
             <a:r>
+              <a:rPr lang="de-DE" b="1"/>
+              <a:t>Linear Regression, baseESN, DeepESN and CNN/LSTM </a:t>
+            </a:r>
+            <a:r>
               <a:rPr lang="de-DE"/>
-              <a:t>Observe that we </a:t>
-            </a:r>
-            <a:r>
-              <a:rPr lang="de-DE" b="1"/>
-              <a:t>get back some problems </a:t>
-            </a:r>
-            <a:r>
-              <a:rPr lang="de-DE"/>
-              <a:t>from training ANNs, when we apply gradient descent optimization:</a:t>
-            </a:r>
-          </a:p>
-          <a:p>
-            <a:pPr marL="742950" lvl="1" indent="-285750">
-              <a:buFont typeface="Courier New" panose="02070309020205020404" pitchFamily="49" charset="0"/>
-              <a:buChar char="o"/>
-            </a:pPr>
-            <a:r>
-              <a:rPr lang="de-DE" b="1"/>
-              <a:t>overfitting</a:t>
-            </a:r>
-            <a:r>
-              <a:rPr lang="de-DE"/>
-              <a:t>: train_mse decreases while val_mse starts to rise or even explodes. Force early stopping!</a:t>
-            </a:r>
-          </a:p>
-          <a:p>
-            <a:pPr marL="742950" lvl="1" indent="-285750">
-              <a:buFont typeface="Courier New" panose="02070309020205020404" pitchFamily="49" charset="0"/>
-              <a:buChar char="o"/>
-            </a:pPr>
-            <a:r>
-              <a:rPr lang="de-DE"/>
-              <a:t>Can be </a:t>
-            </a:r>
-            <a:r>
-              <a:rPr lang="de-DE" b="1"/>
-              <a:t>stuck in local minimum </a:t>
-            </a:r>
-            <a:r>
-              <a:rPr lang="de-DE"/>
-              <a:t>of parameter space.</a:t>
+              <a:t>all end up with similar accuracies for target length up to three months and fail for longer target lengths.</a:t>
             </a:r>
           </a:p>
           <a:p>
@@ -5665,114 +6058,12 @@
               <a:buChar char="•"/>
             </a:pPr>
             <a:r>
+              <a:rPr lang="de-DE" b="1"/>
+              <a:t>Good toy example </a:t>
+            </a:r>
+            <a:r>
               <a:rPr lang="de-DE"/>
-              <a:t>Challenge: How to find „suitable“ initial parameters? (see paper [Öztürk et al., 2020], they use fisher maximation)</a:t>
-            </a:r>
-          </a:p>
-          <a:p>
-            <a:pPr lvl="1"/>
-            <a:endParaRPr lang="de-DE"/>
-          </a:p>
-          <a:p>
-            <a:r>
-              <a:rPr lang="de-DE"/>
-              <a:t>Some optional next steps to keep in mind:</a:t>
-            </a:r>
-          </a:p>
-          <a:p>
-            <a:pPr marL="285750" indent="-285750">
-              <a:buFont typeface="Arial" panose="020B0604020202020204" pitchFamily="34" charset="0"/>
-              <a:buChar char="•"/>
-            </a:pPr>
-            <a:r>
-              <a:rPr lang="de-DE"/>
-              <a:t>Check: Do multiple runs leed to comparable/similar optimal parameters? (--&gt; </a:t>
-            </a:r>
-            <a:r>
-              <a:rPr lang="de-DE" b="1"/>
-              <a:t>Reproducibility</a:t>
-            </a:r>
-            <a:r>
-              <a:rPr lang="de-DE"/>
-              <a:t> desired!)</a:t>
-            </a:r>
-          </a:p>
-          <a:p>
-            <a:pPr marL="285750" indent="-285750">
-              <a:buFont typeface="Arial" panose="020B0604020202020204" pitchFamily="34" charset="0"/>
-              <a:buChar char="•"/>
-            </a:pPr>
-            <a:r>
-              <a:rPr lang="de-DE"/>
-              <a:t>One could try to </a:t>
-            </a:r>
-            <a:r>
-              <a:rPr lang="de-DE" b="1"/>
-              <a:t>extend the optimization algorithm to DeepESN </a:t>
-            </a:r>
-            <a:r>
-              <a:rPr lang="de-DE"/>
-              <a:t>models: Further parameter n_layers.</a:t>
-            </a:r>
-          </a:p>
-          <a:p>
-            <a:pPr marL="285750" indent="-285750">
-              <a:buFont typeface="Arial" panose="020B0604020202020204" pitchFamily="34" charset="0"/>
-              <a:buChar char="•"/>
-            </a:pPr>
-            <a:r>
-              <a:rPr lang="de-DE"/>
-              <a:t>Could think of </a:t>
-            </a:r>
-            <a:r>
-              <a:rPr lang="de-DE" b="1"/>
-              <a:t>adding some form of </a:t>
-            </a:r>
-            <a:r>
-              <a:rPr lang="de-DE" b="1" i="1"/>
-              <a:t>momentum</a:t>
-            </a:r>
-            <a:r>
-              <a:rPr lang="de-DE"/>
-              <a:t>, like in ADAM optimizer.</a:t>
-            </a:r>
-          </a:p>
-          <a:p>
-            <a:pPr marL="285750" indent="-285750">
-              <a:buFont typeface="Arial" panose="020B0604020202020204" pitchFamily="34" charset="0"/>
-              <a:buChar char="•"/>
-            </a:pPr>
-            <a:r>
-              <a:rPr lang="de-DE"/>
-              <a:t>But most important: Switch to </a:t>
-            </a:r>
-            <a:r>
-              <a:rPr lang="de-DE" b="1"/>
-              <a:t>Stochastic Gradient Descent</a:t>
-            </a:r>
-            <a:r>
-              <a:rPr lang="de-DE"/>
-              <a:t>:</a:t>
-            </a:r>
-          </a:p>
-          <a:p>
-            <a:pPr marL="742950" lvl="1" indent="-285750">
-              <a:buFont typeface="Courier New" panose="02070309020205020404" pitchFamily="49" charset="0"/>
-              <a:buChar char="o"/>
-            </a:pPr>
-            <a:r>
-              <a:rPr lang="de-DE"/>
-              <a:t>Instead of systematically turning input parameters up/down by single steps, one could randomly modify single (or multiple) parameters. Then calculate effect objective function (e.g. accuracy) and reject or accept modification. To avoid getting stuck in local minima to easily, need some "tunneling-rate": If modification leads to only slight decline in accuracy, still accept it as new setting.</a:t>
-            </a:r>
-          </a:p>
-          <a:p>
-            <a:pPr marL="742950" lvl="1" indent="-285750">
-              <a:buFont typeface="Courier New" panose="02070309020205020404" pitchFamily="49" charset="0"/>
-              <a:buChar char="o"/>
-            </a:pPr>
-            <a:r>
-              <a:rPr lang="de-DE"/>
-              <a:t>Could also think about initializing base parameters randomly.</a:t>
+              <a:t>for implementing and testing (Deep)ESN functionality (including Gradient Descent optimization).</a:t>
             </a:r>
           </a:p>
           <a:p>
@@ -5784,10 +6075,272 @@
           </a:p>
         </p:txBody>
       </p:sp>
+      <p:pic>
+        <p:nvPicPr>
+          <p:cNvPr id="2" name="Grafik 1">
+            <a:extLst>
+              <a:ext uri="{FF2B5EF4-FFF2-40B4-BE49-F238E27FC236}">
+                <a16:creationId xmlns:a16="http://schemas.microsoft.com/office/drawing/2014/main" id="{B87FBD57-8442-164C-B529-D284533D0198}"/>
+              </a:ext>
+            </a:extLst>
+          </p:cNvPr>
+          <p:cNvPicPr>
+            <a:picLocks noChangeAspect="1"/>
+          </p:cNvPicPr>
+          <p:nvPr/>
+        </p:nvPicPr>
+        <p:blipFill>
+          <a:blip r:embed="rId2"/>
+          <a:stretch>
+            <a:fillRect/>
+          </a:stretch>
+        </p:blipFill>
+        <p:spPr>
+          <a:xfrm>
+            <a:off x="8895321" y="914398"/>
+            <a:ext cx="3238500" cy="1676400"/>
+          </a:xfrm>
+          <a:prstGeom prst="rect">
+            <a:avLst/>
+          </a:prstGeom>
+        </p:spPr>
+      </p:pic>
+      <p:sp>
+        <p:nvSpPr>
+          <p:cNvPr id="6" name="Textfeld 5">
+            <a:extLst>
+              <a:ext uri="{FF2B5EF4-FFF2-40B4-BE49-F238E27FC236}">
+                <a16:creationId xmlns:a16="http://schemas.microsoft.com/office/drawing/2014/main" id="{6F16BE29-7939-BF4E-9CA4-7D0C9057446A}"/>
+              </a:ext>
+            </a:extLst>
+          </p:cNvPr>
+          <p:cNvSpPr txBox="1"/>
+          <p:nvPr/>
+        </p:nvSpPr>
+        <p:spPr>
+          <a:xfrm>
+            <a:off x="543696" y="2626233"/>
+            <a:ext cx="5782963" cy="3693319"/>
+          </a:xfrm>
+          <a:prstGeom prst="rect">
+            <a:avLst/>
+          </a:prstGeom>
+          <a:noFill/>
+        </p:spPr>
+        <p:txBody>
+          <a:bodyPr wrap="square" rtlCol="0">
+            <a:spAutoFit/>
+          </a:bodyPr>
+          <a:lstStyle/>
+          <a:p>
+            <a:endParaRPr lang="de-DE"/>
+          </a:p>
+          <a:p>
+            <a:pPr marL="285750" indent="-285750">
+              <a:buFont typeface="Arial" panose="020B0604020202020204" pitchFamily="34" charset="0"/>
+              <a:buChar char="•"/>
+            </a:pPr>
+            <a:r>
+              <a:rPr lang="de-DE" b="1"/>
+              <a:t>Need additional input features </a:t>
+            </a:r>
+            <a:r>
+              <a:rPr lang="de-DE"/>
+              <a:t>for long-term predictions and tackling similar problems (oscillations).</a:t>
+            </a:r>
+          </a:p>
+          <a:p>
+            <a:pPr marL="285750" indent="-285750">
+              <a:buFont typeface="Arial" panose="020B0604020202020204" pitchFamily="34" charset="0"/>
+              <a:buChar char="•"/>
+            </a:pPr>
+            <a:r>
+              <a:rPr lang="de-DE"/>
+              <a:t>Model data from </a:t>
+            </a:r>
+            <a:r>
+              <a:rPr lang="de-DE" b="1"/>
+              <a:t>FOCI</a:t>
+            </a:r>
+            <a:r>
+              <a:rPr lang="de-DE"/>
+              <a:t> run:</a:t>
+            </a:r>
+          </a:p>
+          <a:p>
+            <a:pPr marL="742950" lvl="1" indent="-285750">
+              <a:buFont typeface="Courier New" panose="02070309020205020404" pitchFamily="49" charset="0"/>
+              <a:buChar char="o"/>
+            </a:pPr>
+            <a:r>
+              <a:rPr lang="de-DE"/>
+              <a:t>sea-surface temperature</a:t>
+            </a:r>
+          </a:p>
+          <a:p>
+            <a:pPr marL="742950" lvl="1" indent="-285750">
+              <a:buFont typeface="Courier New" panose="02070309020205020404" pitchFamily="49" charset="0"/>
+              <a:buChar char="o"/>
+            </a:pPr>
+            <a:r>
+              <a:rPr lang="de-DE"/>
+              <a:t>sea-surface pressure</a:t>
+            </a:r>
+          </a:p>
+          <a:p>
+            <a:pPr marL="742950" lvl="1" indent="-285750">
+              <a:buFont typeface="Courier New" panose="02070309020205020404" pitchFamily="49" charset="0"/>
+              <a:buChar char="o"/>
+            </a:pPr>
+            <a:r>
+              <a:rPr lang="de-DE"/>
+              <a:t>wind direction / speed (trade winds)</a:t>
+            </a:r>
+          </a:p>
+          <a:p>
+            <a:pPr marL="742950" lvl="1" indent="-285750">
+              <a:buFont typeface="Courier New" panose="02070309020205020404" pitchFamily="49" charset="0"/>
+              <a:buChar char="o"/>
+            </a:pPr>
+            <a:r>
+              <a:rPr lang="de-DE"/>
+              <a:t>precipitation / humidity</a:t>
+            </a:r>
+          </a:p>
+          <a:p>
+            <a:pPr marL="742950" lvl="1" indent="-285750">
+              <a:buFont typeface="Courier New" panose="02070309020205020404" pitchFamily="49" charset="0"/>
+              <a:buChar char="o"/>
+            </a:pPr>
+            <a:r>
+              <a:rPr lang="de-DE"/>
+              <a:t>ocean currents, upwelling / downwelling</a:t>
+            </a:r>
+          </a:p>
+          <a:p>
+            <a:pPr marL="742950" lvl="1" indent="-285750">
+              <a:buFont typeface="Courier New" panose="02070309020205020404" pitchFamily="49" charset="0"/>
+              <a:buChar char="o"/>
+            </a:pPr>
+            <a:endParaRPr lang="de-DE"/>
+          </a:p>
+          <a:p>
+            <a:pPr marL="285750" indent="-285750">
+              <a:buFont typeface="Arial" panose="020B0604020202020204" pitchFamily="34" charset="0"/>
+              <a:buChar char="•"/>
+            </a:pPr>
+            <a:r>
+              <a:rPr lang="de-DE"/>
+              <a:t>Get really </a:t>
+            </a:r>
+            <a:r>
+              <a:rPr lang="de-DE" b="1"/>
+              <a:t>long timeseries</a:t>
+            </a:r>
+            <a:r>
+              <a:rPr lang="de-DE"/>
+              <a:t>, modelling the underlying physical processes after spin-up.</a:t>
+            </a:r>
+          </a:p>
+          <a:p>
+            <a:pPr marL="285750" indent="-285750">
+              <a:buFont typeface="Arial" panose="020B0604020202020204" pitchFamily="34" charset="0"/>
+              <a:buChar char="•"/>
+            </a:pPr>
+            <a:r>
+              <a:rPr lang="de-DE"/>
+              <a:t>Use features in modular way.</a:t>
+            </a:r>
+          </a:p>
+        </p:txBody>
+      </p:sp>
+      <p:sp>
+        <p:nvSpPr>
+          <p:cNvPr id="8" name="Oval 7">
+            <a:extLst>
+              <a:ext uri="{FF2B5EF4-FFF2-40B4-BE49-F238E27FC236}">
+                <a16:creationId xmlns:a16="http://schemas.microsoft.com/office/drawing/2014/main" id="{5CFBFC3B-8649-D347-9AFA-1C62D7A9B8D8}"/>
+              </a:ext>
+            </a:extLst>
+          </p:cNvPr>
+          <p:cNvSpPr/>
+          <p:nvPr/>
+        </p:nvSpPr>
+        <p:spPr>
+          <a:xfrm>
+            <a:off x="9816159" y="1477705"/>
+            <a:ext cx="1202594" cy="549786"/>
+          </a:xfrm>
+          <a:prstGeom prst="ellipse">
+            <a:avLst/>
+          </a:prstGeom>
+          <a:noFill/>
+          <a:ln w="25400">
+            <a:solidFill>
+              <a:srgbClr val="FF0000"/>
+            </a:solidFill>
+            <a:prstDash val="sysDot"/>
+          </a:ln>
+        </p:spPr>
+        <p:style>
+          <a:lnRef idx="2">
+            <a:schemeClr val="accent1">
+              <a:shade val="50000"/>
+            </a:schemeClr>
+          </a:lnRef>
+          <a:fillRef idx="1">
+            <a:schemeClr val="accent1"/>
+          </a:fillRef>
+          <a:effectRef idx="0">
+            <a:schemeClr val="accent1"/>
+          </a:effectRef>
+          <a:fontRef idx="minor">
+            <a:schemeClr val="lt1"/>
+          </a:fontRef>
+        </p:style>
+        <p:txBody>
+          <a:bodyPr rtlCol="0" anchor="ctr"/>
+          <a:lstStyle/>
+          <a:p>
+            <a:pPr algn="ctr"/>
+            <a:endParaRPr lang="de-DE"/>
+          </a:p>
+        </p:txBody>
+      </p:sp>
+      <p:pic>
+        <p:nvPicPr>
+          <p:cNvPr id="3" name="Grafik 2">
+            <a:extLst>
+              <a:ext uri="{FF2B5EF4-FFF2-40B4-BE49-F238E27FC236}">
+                <a16:creationId xmlns:a16="http://schemas.microsoft.com/office/drawing/2014/main" id="{1FD23113-79C4-014C-92BC-01FA438E2A0D}"/>
+              </a:ext>
+            </a:extLst>
+          </p:cNvPr>
+          <p:cNvPicPr>
+            <a:picLocks noChangeAspect="1"/>
+          </p:cNvPicPr>
+          <p:nvPr/>
+        </p:nvPicPr>
+        <p:blipFill>
+          <a:blip r:embed="rId3"/>
+          <a:stretch>
+            <a:fillRect/>
+          </a:stretch>
+        </p:blipFill>
+        <p:spPr>
+          <a:xfrm>
+            <a:off x="6854546" y="2957365"/>
+            <a:ext cx="4882271" cy="3431835"/>
+          </a:xfrm>
+          <a:prstGeom prst="rect">
+            <a:avLst/>
+          </a:prstGeom>
+        </p:spPr>
+      </p:pic>
     </p:spTree>
     <p:extLst>
       <p:ext uri="{BB962C8B-B14F-4D97-AF65-F5344CB8AC3E}">
-        <p14:creationId xmlns:p14="http://schemas.microsoft.com/office/powerpoint/2010/main" val="1947400364"/>
+        <p14:creationId xmlns:p14="http://schemas.microsoft.com/office/powerpoint/2010/main" val="781926011"/>
       </p:ext>
     </p:extLst>
   </p:cSld>
@@ -5873,17 +6426,17 @@
           <a:p>
             <a:r>
               <a:rPr lang="de-DE" sz="2400" b="1" dirty="0"/>
-              <a:t>Idea: „Agglomerative Relevance“</a:t>
-            </a:r>
-          </a:p>
-        </p:txBody>
-      </p:sp>
-      <p:sp>
-        <p:nvSpPr>
-          <p:cNvPr id="6" name="Textfeld 5">
-            <a:extLst>
-              <a:ext uri="{FF2B5EF4-FFF2-40B4-BE49-F238E27FC236}">
-                <a16:creationId xmlns:a16="http://schemas.microsoft.com/office/drawing/2014/main" id="{6F16BE29-7939-BF4E-9CA4-7D0C9057446A}"/>
+              <a:t>Discussion on Gradient Descent Optimization</a:t>
+            </a:r>
+          </a:p>
+        </p:txBody>
+      </p:sp>
+      <p:sp>
+        <p:nvSpPr>
+          <p:cNvPr id="5" name="Textfeld 4">
+            <a:extLst>
+              <a:ext uri="{FF2B5EF4-FFF2-40B4-BE49-F238E27FC236}">
+                <a16:creationId xmlns:a16="http://schemas.microsoft.com/office/drawing/2014/main" id="{7B349DC1-8020-704C-A9A0-4D7FFCADBAC0}"/>
               </a:ext>
             </a:extLst>
           </p:cNvPr>
@@ -5892,8 +6445,8 @@
         </p:nvSpPr>
         <p:spPr>
           <a:xfrm>
-            <a:off x="365769" y="1443841"/>
-            <a:ext cx="8066903" cy="3416320"/>
+            <a:off x="543697" y="1112108"/>
+            <a:ext cx="10600553" cy="5078313"/>
           </a:xfrm>
           <a:prstGeom prst="rect">
             <a:avLst/>
@@ -5911,8 +6464,30 @@
               <a:buChar char="•"/>
             </a:pPr>
             <a:r>
+              <a:rPr lang="de-DE" b="1"/>
+              <a:t>Very fast </a:t>
+            </a:r>
+            <a:r>
               <a:rPr lang="de-DE"/>
-              <a:t>Try idea – inspired by LRP paper („Physically Interpretable Neural Networks for the Geosciences: Applications to Earth System Variability“)</a:t>
+              <a:t>optimization (compared to gridsearch over ALL possible parameter combinations).</a:t>
+            </a:r>
+          </a:p>
+          <a:p>
+            <a:pPr marL="285750" indent="-285750">
+              <a:buFont typeface="Arial" panose="020B0604020202020204" pitchFamily="34" charset="0"/>
+              <a:buChar char="•"/>
+            </a:pPr>
+            <a:r>
+              <a:rPr lang="de-DE"/>
+              <a:t>Observe that we </a:t>
+            </a:r>
+            <a:r>
+              <a:rPr lang="de-DE" b="1"/>
+              <a:t>get back some problems </a:t>
+            </a:r>
+            <a:r>
+              <a:rPr lang="de-DE"/>
+              <a:t>from training ANNs, when we apply gradient descent optimization:</a:t>
             </a:r>
           </a:p>
           <a:p>
@@ -5921,8 +6496,12 @@
               <a:buChar char="o"/>
             </a:pPr>
             <a:r>
+              <a:rPr lang="de-DE" b="1"/>
+              <a:t>overfitting</a:t>
+            </a:r>
+            <a:r>
               <a:rPr lang="de-DE"/>
-              <a:t>Take increasing number of gridpoints from SST field as input. Focus on extended Nino region, to limit number of gridpoints.</a:t>
+              <a:t>: train_mse decreases while val_mse starts to rise or even explodes. Force early stopping!</a:t>
             </a:r>
           </a:p>
           <a:p>
@@ -5932,7 +6511,111 @@
             </a:pPr>
             <a:r>
               <a:rPr lang="de-DE"/>
-              <a:t>Start with gridpoint that (alone) leeds to highest acccuracy on predicting El Nino / La Nina events.</a:t>
+              <a:t>Can be </a:t>
+            </a:r>
+            <a:r>
+              <a:rPr lang="de-DE" b="1"/>
+              <a:t>stuck in local minimum </a:t>
+            </a:r>
+            <a:r>
+              <a:rPr lang="de-DE"/>
+              <a:t>of parameter space.</a:t>
+            </a:r>
+          </a:p>
+          <a:p>
+            <a:pPr marL="285750" indent="-285750">
+              <a:buFont typeface="Arial" panose="020B0604020202020204" pitchFamily="34" charset="0"/>
+              <a:buChar char="•"/>
+            </a:pPr>
+            <a:r>
+              <a:rPr lang="de-DE"/>
+              <a:t>Challenge: How to find „suitable“ initial parameters? (see paper [Öztürk et al., 2020], they use fisher maximation)</a:t>
+            </a:r>
+          </a:p>
+          <a:p>
+            <a:pPr lvl="1"/>
+            <a:endParaRPr lang="de-DE"/>
+          </a:p>
+          <a:p>
+            <a:r>
+              <a:rPr lang="de-DE"/>
+              <a:t>Some optional next steps to keep in mind:</a:t>
+            </a:r>
+          </a:p>
+          <a:p>
+            <a:pPr marL="285750" indent="-285750">
+              <a:buFont typeface="Arial" panose="020B0604020202020204" pitchFamily="34" charset="0"/>
+              <a:buChar char="•"/>
+            </a:pPr>
+            <a:r>
+              <a:rPr lang="de-DE"/>
+              <a:t>Check: Do multiple runs leed to comparable/similar optimal parameters? (--&gt; </a:t>
+            </a:r>
+            <a:r>
+              <a:rPr lang="de-DE" b="1"/>
+              <a:t>Reproducibility</a:t>
+            </a:r>
+            <a:r>
+              <a:rPr lang="de-DE"/>
+              <a:t> desired!)</a:t>
+            </a:r>
+          </a:p>
+          <a:p>
+            <a:pPr marL="285750" indent="-285750">
+              <a:buFont typeface="Arial" panose="020B0604020202020204" pitchFamily="34" charset="0"/>
+              <a:buChar char="•"/>
+            </a:pPr>
+            <a:r>
+              <a:rPr lang="de-DE"/>
+              <a:t>One could try to </a:t>
+            </a:r>
+            <a:r>
+              <a:rPr lang="de-DE" b="1"/>
+              <a:t>extend the optimization algorithm to DeepESN </a:t>
+            </a:r>
+            <a:r>
+              <a:rPr lang="de-DE"/>
+              <a:t>models: Further parameter n_layers.</a:t>
+            </a:r>
+          </a:p>
+          <a:p>
+            <a:pPr marL="285750" indent="-285750">
+              <a:buFont typeface="Arial" panose="020B0604020202020204" pitchFamily="34" charset="0"/>
+              <a:buChar char="•"/>
+            </a:pPr>
+            <a:r>
+              <a:rPr lang="de-DE"/>
+              <a:t>Could think of </a:t>
+            </a:r>
+            <a:r>
+              <a:rPr lang="de-DE" b="1"/>
+              <a:t>adding some form of </a:t>
+            </a:r>
+            <a:r>
+              <a:rPr lang="de-DE" b="1" i="1"/>
+              <a:t>momentum</a:t>
+            </a:r>
+            <a:r>
+              <a:rPr lang="de-DE"/>
+              <a:t>, like in ADAM optimizer.</a:t>
+            </a:r>
+          </a:p>
+          <a:p>
+            <a:pPr marL="285750" indent="-285750">
+              <a:buFont typeface="Arial" panose="020B0604020202020204" pitchFamily="34" charset="0"/>
+              <a:buChar char="•"/>
+            </a:pPr>
+            <a:r>
+              <a:rPr lang="de-DE"/>
+              <a:t>But most important: Switch to </a:t>
+            </a:r>
+            <a:r>
+              <a:rPr lang="de-DE" b="1"/>
+              <a:t>Stochastic Gradient Descent</a:t>
+            </a:r>
+            <a:r>
+              <a:rPr lang="de-DE"/>
+              <a:t>:</a:t>
             </a:r>
           </a:p>
           <a:p>
@@ -5942,15 +6625,7 @@
             </a:pPr>
             <a:r>
               <a:rPr lang="de-DE"/>
-              <a:t>Add further gridpoint and keep the first (vs. look for the two gridpoints) providing highest accuracy („</a:t>
-            </a:r>
-            <a:r>
-              <a:rPr lang="de-DE" b="1"/>
-              <a:t>agglomerative relevance</a:t>
-            </a:r>
-            <a:r>
-              <a:rPr lang="de-DE"/>
-              <a:t>“).</a:t>
+              <a:t>Instead of systematically turning input parameters up/down by single steps, one could randomly modify single (or multiple) parameters. Then calculate effect objective function (e.g. accuracy) and reject or accept modification. To avoid getting stuck in local minima to easily, need some "tunneling-rate": If modification leads to only slight decline in accuracy, still accept it as new setting.</a:t>
             </a:r>
           </a:p>
           <a:p>
@@ -5960,7 +6635,7 @@
             </a:pPr>
             <a:r>
               <a:rPr lang="de-DE"/>
-              <a:t>Look at variance in time for gridpoints of SST anomaly. Expect highest variance in Nino region. Question: Are these gridpoints with highest variance also most relevant for predicting ENSO index?</a:t>
+              <a:t>Could also think about initializing base parameters randomly.</a:t>
             </a:r>
           </a:p>
           <a:p>
@@ -5975,7 +6650,7 @@
     </p:spTree>
     <p:extLst>
       <p:ext uri="{BB962C8B-B14F-4D97-AF65-F5344CB8AC3E}">
-        <p14:creationId xmlns:p14="http://schemas.microsoft.com/office/powerpoint/2010/main" val="1745116613"/>
+        <p14:creationId xmlns:p14="http://schemas.microsoft.com/office/powerpoint/2010/main" val="1947400364"/>
       </p:ext>
     </p:extLst>
   </p:cSld>
@@ -6045,8 +6720,8 @@
         </p:nvSpPr>
         <p:spPr>
           <a:xfrm>
-            <a:off x="365768" y="302411"/>
-            <a:ext cx="8815301" cy="1661993"/>
+            <a:off x="365769" y="302411"/>
+            <a:ext cx="6674128" cy="461665"/>
           </a:xfrm>
           <a:prstGeom prst="rect">
             <a:avLst/>
@@ -6061,28 +6736,94 @@
           <a:p>
             <a:r>
               <a:rPr lang="de-DE" sz="2400" b="1" dirty="0"/>
-              <a:t>First attempt: Agglomerative Relevance</a:t>
-            </a:r>
-          </a:p>
-          <a:p>
-            <a:endParaRPr lang="de-DE" sz="2400" b="1" dirty="0"/>
-          </a:p>
+              <a:t>Idea: „Agglomerative Relevance“</a:t>
+            </a:r>
+          </a:p>
+        </p:txBody>
+      </p:sp>
+      <p:sp>
+        <p:nvSpPr>
+          <p:cNvPr id="6" name="Textfeld 5">
+            <a:extLst>
+              <a:ext uri="{FF2B5EF4-FFF2-40B4-BE49-F238E27FC236}">
+                <a16:creationId xmlns:a16="http://schemas.microsoft.com/office/drawing/2014/main" id="{6F16BE29-7939-BF4E-9CA4-7D0C9057446A}"/>
+              </a:ext>
+            </a:extLst>
+          </p:cNvPr>
+          <p:cNvSpPr txBox="1"/>
+          <p:nvPr/>
+        </p:nvSpPr>
+        <p:spPr>
+          <a:xfrm>
+            <a:off x="365769" y="1443841"/>
+            <a:ext cx="8066903" cy="3416320"/>
+          </a:xfrm>
+          <a:prstGeom prst="rect">
+            <a:avLst/>
+          </a:prstGeom>
+          <a:noFill/>
+        </p:spPr>
+        <p:txBody>
+          <a:bodyPr wrap="square" rtlCol="0">
+            <a:spAutoFit/>
+          </a:bodyPr>
+          <a:lstStyle/>
           <a:p>
             <a:pPr marL="285750" indent="-285750">
               <a:buFont typeface="Arial" panose="020B0604020202020204" pitchFamily="34" charset="0"/>
               <a:buChar char="•"/>
             </a:pPr>
             <a:r>
-              <a:rPr lang="de-DE" dirty="0"/>
-              <a:t>Looked for </a:t>
-            </a:r>
-            <a:r>
-              <a:rPr lang="de-DE" b="1" dirty="0"/>
-              <a:t>single sst timeseries </a:t>
-            </a:r>
-            <a:r>
-              <a:rPr lang="de-DE" dirty="0"/>
-              <a:t>that best predicts sst anomaly (= Nino events)</a:t>
+              <a:rPr lang="de-DE"/>
+              <a:t>Try idea – inspired by LRP paper („Physically Interpretable Neural Networks for the Geosciences: Applications to Earth System Variability“)</a:t>
+            </a:r>
+          </a:p>
+          <a:p>
+            <a:pPr marL="742950" lvl="1" indent="-285750">
+              <a:buFont typeface="Courier New" panose="02070309020205020404" pitchFamily="49" charset="0"/>
+              <a:buChar char="o"/>
+            </a:pPr>
+            <a:r>
+              <a:rPr lang="de-DE"/>
+              <a:t>Take increasing number of gridpoints from SST field as input. Focus on extended Nino region, to limit number of gridpoints.</a:t>
+            </a:r>
+          </a:p>
+          <a:p>
+            <a:pPr marL="742950" lvl="1" indent="-285750">
+              <a:buFont typeface="Courier New" panose="02070309020205020404" pitchFamily="49" charset="0"/>
+              <a:buChar char="o"/>
+            </a:pPr>
+            <a:r>
+              <a:rPr lang="de-DE"/>
+              <a:t>Start with gridpoint that (alone) leeds to highest acccuracy on predicting El Nino / La Nina events.</a:t>
+            </a:r>
+          </a:p>
+          <a:p>
+            <a:pPr marL="742950" lvl="1" indent="-285750">
+              <a:buFont typeface="Courier New" panose="02070309020205020404" pitchFamily="49" charset="0"/>
+              <a:buChar char="o"/>
+            </a:pPr>
+            <a:r>
+              <a:rPr lang="de-DE"/>
+              <a:t>Add further gridpoint and keep the first (vs. look for the two gridpoints) providing highest accuracy („</a:t>
+            </a:r>
+            <a:r>
+              <a:rPr lang="de-DE" b="1"/>
+              <a:t>agglomerative relevance</a:t>
+            </a:r>
+            <a:r>
+              <a:rPr lang="de-DE"/>
+              <a:t>“).</a:t>
+            </a:r>
+          </a:p>
+          <a:p>
+            <a:pPr marL="742950" lvl="1" indent="-285750">
+              <a:buFont typeface="Courier New" panose="02070309020205020404" pitchFamily="49" charset="0"/>
+              <a:buChar char="o"/>
+            </a:pPr>
+            <a:r>
+              <a:rPr lang="de-DE"/>
+              <a:t>Look at variance in time for gridpoints of SST anomaly. Expect highest variance in Nino region. Question: Are these gridpoints with highest variance also most relevant for predicting ENSO index?</a:t>
             </a:r>
           </a:p>
           <a:p>
@@ -6090,69 +6831,14 @@
               <a:buFont typeface="Arial" panose="020B0604020202020204" pitchFamily="34" charset="0"/>
               <a:buChar char="•"/>
             </a:pPr>
-            <a:r>
-              <a:rPr lang="de-DE" dirty="0"/>
-              <a:t>Only considered gridpoints </a:t>
-            </a:r>
-            <a:r>
-              <a:rPr lang="de-DE" b="1" dirty="0"/>
-              <a:t>from Nino3.4 box</a:t>
-            </a:r>
-            <a:r>
-              <a:rPr lang="de-DE" dirty="0"/>
-              <a:t>.</a:t>
-            </a:r>
-          </a:p>
-          <a:p>
-            <a:pPr marL="285750" indent="-285750">
-              <a:buFont typeface="Arial" panose="020B0604020202020204" pitchFamily="34" charset="0"/>
-              <a:buChar char="•"/>
-            </a:pPr>
-            <a:r>
-              <a:rPr lang="de-DE" dirty="0">
-                <a:solidFill>
-                  <a:srgbClr val="FF0000"/>
-                </a:solidFill>
-              </a:rPr>
-              <a:t>target_length = 1</a:t>
-            </a:r>
-          </a:p>
-        </p:txBody>
-      </p:sp>
-      <p:pic>
-        <p:nvPicPr>
-          <p:cNvPr id="2" name="Grafik 1">
-            <a:extLst>
-              <a:ext uri="{FF2B5EF4-FFF2-40B4-BE49-F238E27FC236}">
-                <a16:creationId xmlns:a16="http://schemas.microsoft.com/office/drawing/2014/main" id="{D3182172-1656-EA47-A423-8FCF8D9DA710}"/>
-              </a:ext>
-            </a:extLst>
-          </p:cNvPr>
-          <p:cNvPicPr>
-            <a:picLocks noChangeAspect="1"/>
-          </p:cNvPicPr>
-          <p:nvPr/>
-        </p:nvPicPr>
-        <p:blipFill>
-          <a:blip r:embed="rId2"/>
-          <a:stretch>
-            <a:fillRect/>
-          </a:stretch>
-        </p:blipFill>
-        <p:spPr>
-          <a:xfrm>
-            <a:off x="2011748" y="2241550"/>
-            <a:ext cx="7797800" cy="4114800"/>
-          </a:xfrm>
-          <a:prstGeom prst="rect">
-            <a:avLst/>
-          </a:prstGeom>
-        </p:spPr>
-      </p:pic>
+            <a:endParaRPr lang="de-DE"/>
+          </a:p>
+        </p:txBody>
+      </p:sp>
     </p:spTree>
     <p:extLst>
       <p:ext uri="{BB962C8B-B14F-4D97-AF65-F5344CB8AC3E}">
-        <p14:creationId xmlns:p14="http://schemas.microsoft.com/office/powerpoint/2010/main" val="156861512"/>
+        <p14:creationId xmlns:p14="http://schemas.microsoft.com/office/powerpoint/2010/main" val="1745116613"/>
       </p:ext>
     </p:extLst>
   </p:cSld>
@@ -6203,6 +6889,183 @@
             <a:fld id="{884D93BF-CEC1-484B-B797-4695C35961E3}" type="slidenum">
               <a:rPr lang="de-DE" smtClean="0"/>
               <a:t>17</a:t>
+            </a:fld>
+            <a:endParaRPr lang="de-DE"/>
+          </a:p>
+        </p:txBody>
+      </p:sp>
+      <p:sp>
+        <p:nvSpPr>
+          <p:cNvPr id="7" name="Textfeld 6">
+            <a:extLst>
+              <a:ext uri="{FF2B5EF4-FFF2-40B4-BE49-F238E27FC236}">
+                <a16:creationId xmlns:a16="http://schemas.microsoft.com/office/drawing/2014/main" id="{FF8A926B-8B78-834F-BFBA-9405321487C6}"/>
+              </a:ext>
+            </a:extLst>
+          </p:cNvPr>
+          <p:cNvSpPr txBox="1"/>
+          <p:nvPr/>
+        </p:nvSpPr>
+        <p:spPr>
+          <a:xfrm>
+            <a:off x="365768" y="302411"/>
+            <a:ext cx="8815301" cy="1661993"/>
+          </a:xfrm>
+          <a:prstGeom prst="rect">
+            <a:avLst/>
+          </a:prstGeom>
+          <a:noFill/>
+        </p:spPr>
+        <p:txBody>
+          <a:bodyPr wrap="square" rtlCol="0">
+            <a:spAutoFit/>
+          </a:bodyPr>
+          <a:lstStyle/>
+          <a:p>
+            <a:r>
+              <a:rPr lang="de-DE" sz="2400" b="1" dirty="0"/>
+              <a:t>First attempt: Agglomerative Relevance</a:t>
+            </a:r>
+          </a:p>
+          <a:p>
+            <a:endParaRPr lang="de-DE" sz="2400" b="1" dirty="0"/>
+          </a:p>
+          <a:p>
+            <a:pPr marL="285750" indent="-285750">
+              <a:buFont typeface="Arial" panose="020B0604020202020204" pitchFamily="34" charset="0"/>
+              <a:buChar char="•"/>
+            </a:pPr>
+            <a:r>
+              <a:rPr lang="de-DE" dirty="0"/>
+              <a:t>Looked for </a:t>
+            </a:r>
+            <a:r>
+              <a:rPr lang="de-DE" b="1" dirty="0"/>
+              <a:t>single sst timeseries </a:t>
+            </a:r>
+            <a:r>
+              <a:rPr lang="de-DE" dirty="0"/>
+              <a:t>that best predicts sst anomaly (= Nino events)</a:t>
+            </a:r>
+          </a:p>
+          <a:p>
+            <a:pPr marL="285750" indent="-285750">
+              <a:buFont typeface="Arial" panose="020B0604020202020204" pitchFamily="34" charset="0"/>
+              <a:buChar char="•"/>
+            </a:pPr>
+            <a:r>
+              <a:rPr lang="de-DE" dirty="0"/>
+              <a:t>Only considered gridpoints </a:t>
+            </a:r>
+            <a:r>
+              <a:rPr lang="de-DE" b="1" dirty="0"/>
+              <a:t>from Nino3.4 box</a:t>
+            </a:r>
+            <a:r>
+              <a:rPr lang="de-DE" dirty="0"/>
+              <a:t>.</a:t>
+            </a:r>
+          </a:p>
+          <a:p>
+            <a:pPr marL="285750" indent="-285750">
+              <a:buFont typeface="Arial" panose="020B0604020202020204" pitchFamily="34" charset="0"/>
+              <a:buChar char="•"/>
+            </a:pPr>
+            <a:r>
+              <a:rPr lang="de-DE" dirty="0">
+                <a:solidFill>
+                  <a:srgbClr val="FF0000"/>
+                </a:solidFill>
+              </a:rPr>
+              <a:t>target_length = 1</a:t>
+            </a:r>
+          </a:p>
+        </p:txBody>
+      </p:sp>
+      <p:pic>
+        <p:nvPicPr>
+          <p:cNvPr id="2" name="Grafik 1">
+            <a:extLst>
+              <a:ext uri="{FF2B5EF4-FFF2-40B4-BE49-F238E27FC236}">
+                <a16:creationId xmlns:a16="http://schemas.microsoft.com/office/drawing/2014/main" id="{D3182172-1656-EA47-A423-8FCF8D9DA710}"/>
+              </a:ext>
+            </a:extLst>
+          </p:cNvPr>
+          <p:cNvPicPr>
+            <a:picLocks noChangeAspect="1"/>
+          </p:cNvPicPr>
+          <p:nvPr/>
+        </p:nvPicPr>
+        <p:blipFill>
+          <a:blip r:embed="rId2"/>
+          <a:stretch>
+            <a:fillRect/>
+          </a:stretch>
+        </p:blipFill>
+        <p:spPr>
+          <a:xfrm>
+            <a:off x="2011748" y="2241550"/>
+            <a:ext cx="7797800" cy="4114800"/>
+          </a:xfrm>
+          <a:prstGeom prst="rect">
+            <a:avLst/>
+          </a:prstGeom>
+        </p:spPr>
+      </p:pic>
+    </p:spTree>
+    <p:extLst>
+      <p:ext uri="{BB962C8B-B14F-4D97-AF65-F5344CB8AC3E}">
+        <p14:creationId xmlns:p14="http://schemas.microsoft.com/office/powerpoint/2010/main" val="156861512"/>
+      </p:ext>
+    </p:extLst>
+  </p:cSld>
+  <p:clrMapOvr>
+    <a:masterClrMapping/>
+  </p:clrMapOvr>
+</p:sld>
+</file>
+
+<file path=ppt/slides/slide18.xml><?xml version="1.0" encoding="utf-8"?>
+<p:sld xmlns:a="http://schemas.openxmlformats.org/drawingml/2006/main" xmlns:r="http://schemas.openxmlformats.org/officeDocument/2006/relationships" xmlns:p="http://schemas.openxmlformats.org/presentationml/2006/main">
+  <p:cSld>
+    <p:spTree>
+      <p:nvGrpSpPr>
+        <p:cNvPr id="1" name=""/>
+        <p:cNvGrpSpPr/>
+        <p:nvPr/>
+      </p:nvGrpSpPr>
+      <p:grpSpPr>
+        <a:xfrm>
+          <a:off x="0" y="0"/>
+          <a:ext cx="0" cy="0"/>
+          <a:chOff x="0" y="0"/>
+          <a:chExt cx="0" cy="0"/>
+        </a:xfrm>
+      </p:grpSpPr>
+      <p:sp>
+        <p:nvSpPr>
+          <p:cNvPr id="4" name="Foliennummernplatzhalter 3">
+            <a:extLst>
+              <a:ext uri="{FF2B5EF4-FFF2-40B4-BE49-F238E27FC236}">
+                <a16:creationId xmlns:a16="http://schemas.microsoft.com/office/drawing/2014/main" id="{9752BF9B-20ED-124C-8D78-032D3F29C212}"/>
+              </a:ext>
+            </a:extLst>
+          </p:cNvPr>
+          <p:cNvSpPr>
+            <a:spLocks noGrp="1"/>
+          </p:cNvSpPr>
+          <p:nvPr>
+            <p:ph type="sldNum" sz="quarter" idx="12"/>
+          </p:nvPr>
+        </p:nvSpPr>
+        <p:spPr/>
+        <p:txBody>
+          <a:bodyPr/>
+          <a:lstStyle/>
+          <a:p>
+            <a:fld id="{884D93BF-CEC1-484B-B797-4695C35961E3}" type="slidenum">
+              <a:rPr lang="de-DE" smtClean="0"/>
+              <a:t>18</a:t>
             </a:fld>
             <a:endParaRPr lang="de-DE"/>
           </a:p>
@@ -15445,309 +16308,57 @@
           </a:p>
         </p:txBody>
       </p:sp>
-      <p:sp>
-        <p:nvSpPr>
-          <p:cNvPr id="5" name="Textfeld 4">
-            <a:extLst>
-              <a:ext uri="{FF2B5EF4-FFF2-40B4-BE49-F238E27FC236}">
-                <a16:creationId xmlns:a16="http://schemas.microsoft.com/office/drawing/2014/main" id="{7B349DC1-8020-704C-A9A0-4D7FFCADBAC0}"/>
-              </a:ext>
-            </a:extLst>
-          </p:cNvPr>
-          <p:cNvSpPr txBox="1"/>
-          <p:nvPr/>
-        </p:nvSpPr>
-        <p:spPr>
-          <a:xfrm>
-            <a:off x="543697" y="1112108"/>
-            <a:ext cx="11204958" cy="3970318"/>
+      <p:pic>
+        <p:nvPicPr>
+          <p:cNvPr id="1030" name="Picture 6">
+            <a:extLst>
+              <a:ext uri="{FF2B5EF4-FFF2-40B4-BE49-F238E27FC236}">
+                <a16:creationId xmlns:a16="http://schemas.microsoft.com/office/drawing/2014/main" id="{B5FE196A-2CE7-DC47-90CE-4B2EB39A4A3C}"/>
+              </a:ext>
+            </a:extLst>
+          </p:cNvPr>
+          <p:cNvPicPr>
+            <a:picLocks noChangeAspect="1" noChangeArrowheads="1"/>
+          </p:cNvPicPr>
+          <p:nvPr/>
+        </p:nvPicPr>
+        <p:blipFill>
+          <a:blip r:embed="rId2">
+            <a:extLst>
+              <a:ext uri="{28A0092B-C50C-407E-A947-70E740481C1C}">
+                <a14:useLocalDpi xmlns:a14="http://schemas.microsoft.com/office/drawing/2010/main" val="0"/>
+              </a:ext>
+            </a:extLst>
+          </a:blip>
+          <a:srcRect/>
+          <a:stretch>
+            <a:fillRect/>
+          </a:stretch>
+        </p:blipFill>
+        <p:spPr bwMode="auto">
+          <a:xfrm>
+            <a:off x="1327385" y="903440"/>
+            <a:ext cx="9537229" cy="5784196"/>
           </a:xfrm>
           <a:prstGeom prst="rect">
             <a:avLst/>
           </a:prstGeom>
           <a:noFill/>
-        </p:spPr>
-        <p:txBody>
-          <a:bodyPr wrap="square" rtlCol="0">
-            <a:spAutoFit/>
-          </a:bodyPr>
-          <a:lstStyle/>
-          <a:p>
-            <a:pPr marL="285750" indent="-285750">
-              <a:buFont typeface="Arial" panose="020B0604020202020204" pitchFamily="34" charset="0"/>
-              <a:buChar char="•"/>
-            </a:pPr>
-            <a:r>
-              <a:rPr lang="de-DE"/>
-              <a:t>Work with </a:t>
-            </a:r>
-            <a:r>
-              <a:rPr lang="de-DE" b="1"/>
-              <a:t>un-scaled ENSO index </a:t>
-            </a:r>
-            <a:r>
-              <a:rPr lang="de-DE"/>
-              <a:t>and stick to </a:t>
-            </a:r>
-            <a:r>
-              <a:rPr lang="de-DE" b="1"/>
-              <a:t>‚sigmoid‘ activation</a:t>
-            </a:r>
-            <a:r>
-              <a:rPr lang="de-DE"/>
-              <a:t>.</a:t>
-            </a:r>
-          </a:p>
-          <a:p>
-            <a:pPr marL="285750" indent="-285750">
-              <a:buFont typeface="Arial" panose="020B0604020202020204" pitchFamily="34" charset="0"/>
-              <a:buChar char="•"/>
-            </a:pPr>
-            <a:r>
-              <a:rPr lang="de-DE"/>
-              <a:t>Still have many (hyper-)</a:t>
-            </a:r>
-            <a:r>
-              <a:rPr lang="de-DE" b="1"/>
-              <a:t>parameters</a:t>
-            </a:r>
-            <a:r>
-              <a:rPr lang="de-DE"/>
-              <a:t> to be optimized:</a:t>
-            </a:r>
-          </a:p>
-          <a:p>
-            <a:pPr marL="742950" lvl="1" indent="-285750">
-              <a:buFont typeface="Courier New" panose="02070309020205020404" pitchFamily="49" charset="0"/>
-              <a:buChar char="o"/>
-            </a:pPr>
-            <a:r>
-              <a:rPr lang="de-DE" b="1"/>
-              <a:t>input_length</a:t>
-            </a:r>
-            <a:r>
-              <a:rPr lang="de-DE"/>
-              <a:t>: Number of timesteps per input sample.</a:t>
-            </a:r>
-          </a:p>
-          <a:p>
-            <a:pPr marL="742950" lvl="1" indent="-285750">
-              <a:buFont typeface="Courier New" panose="02070309020205020404" pitchFamily="49" charset="0"/>
-              <a:buChar char="o"/>
-            </a:pPr>
-            <a:r>
-              <a:rPr lang="de-DE" b="1"/>
-              <a:t>n_res</a:t>
-            </a:r>
-            <a:r>
-              <a:rPr lang="de-DE"/>
-              <a:t>: Number of reservoir units.</a:t>
-            </a:r>
-          </a:p>
-          <a:p>
-            <a:pPr marL="742950" lvl="1" indent="-285750">
-              <a:buFont typeface="Courier New" panose="02070309020205020404" pitchFamily="49" charset="0"/>
-              <a:buChar char="o"/>
-            </a:pPr>
-            <a:r>
-              <a:rPr lang="de-DE" b="1"/>
-              <a:t>W_in_lim</a:t>
-            </a:r>
-            <a:r>
-              <a:rPr lang="de-DE"/>
-              <a:t>: Initialize input weights from random distribution in [-W_in_lim, +W_in_lim]</a:t>
-            </a:r>
-          </a:p>
-          <a:p>
-            <a:pPr marL="742950" lvl="1" indent="-285750">
-              <a:buFont typeface="Courier New" panose="02070309020205020404" pitchFamily="49" charset="0"/>
-              <a:buChar char="o"/>
-            </a:pPr>
-            <a:r>
-              <a:rPr lang="de-DE" b="1"/>
-              <a:t>leak_rate</a:t>
-            </a:r>
-            <a:r>
-              <a:rPr lang="de-DE"/>
-              <a:t>: Leak rate used in transition function of reservoir states.</a:t>
-            </a:r>
-          </a:p>
-          <a:p>
-            <a:pPr marL="742950" lvl="1" indent="-285750">
-              <a:buFont typeface="Courier New" panose="02070309020205020404" pitchFamily="49" charset="0"/>
-              <a:buChar char="o"/>
-            </a:pPr>
-            <a:r>
-              <a:rPr lang="de-DE" b="1"/>
-              <a:t>spec_radius</a:t>
-            </a:r>
-            <a:r>
-              <a:rPr lang="de-DE"/>
-              <a:t>: Spectral radius, becomes largest Eigenvalue of reservoir weight matrix</a:t>
-            </a:r>
-          </a:p>
-          <a:p>
-            <a:pPr marL="742950" lvl="1" indent="-285750">
-              <a:buFont typeface="Courier New" panose="02070309020205020404" pitchFamily="49" charset="0"/>
-              <a:buChar char="o"/>
-            </a:pPr>
-            <a:r>
-              <a:rPr lang="de-DE" b="1"/>
-              <a:t>sparsity</a:t>
-            </a:r>
-            <a:r>
-              <a:rPr lang="de-DE"/>
-              <a:t>: Sparsity of reservoir weight matrix.</a:t>
-            </a:r>
-          </a:p>
-          <a:p>
-            <a:pPr marL="742950" lvl="1" indent="-285750">
-              <a:buFont typeface="Courier New" panose="02070309020205020404" pitchFamily="49" charset="0"/>
-              <a:buChar char="o"/>
-            </a:pPr>
-            <a:endParaRPr lang="de-DE"/>
-          </a:p>
-          <a:p>
-            <a:pPr marL="285750" indent="-285750">
-              <a:buFont typeface="Arial" panose="020B0604020202020204" pitchFamily="34" charset="0"/>
-              <a:buChar char="•"/>
-            </a:pPr>
-            <a:r>
-              <a:rPr lang="de-DE"/>
-              <a:t>Instead of </a:t>
-            </a:r>
-            <a:r>
-              <a:rPr lang="de-DE" b="1"/>
-              <a:t>gridsearch</a:t>
-            </a:r>
-            <a:r>
-              <a:rPr lang="de-DE"/>
-              <a:t>, use some form of </a:t>
-            </a:r>
-            <a:r>
-              <a:rPr lang="de-DE" b="1">
+          <a:extLst>
+            <a:ext uri="{909E8E84-426E-40DD-AFC4-6F175D3DCCD1}">
+              <a14:hiddenFill xmlns:a14="http://schemas.microsoft.com/office/drawing/2010/main">
                 <a:solidFill>
-                  <a:srgbClr val="0070C0"/>
+                  <a:srgbClr val="FFFFFF"/>
                 </a:solidFill>
-              </a:rPr>
-              <a:t>gradient descent </a:t>
-            </a:r>
-            <a:r>
-              <a:rPr lang="de-DE"/>
-              <a:t>to find optimal parameters </a:t>
-            </a:r>
-            <a:r>
-              <a:rPr lang="de-DE">
-                <a:solidFill>
-                  <a:srgbClr val="0070C0"/>
-                </a:solidFill>
-              </a:rPr>
-              <a:t>for specified target_length.</a:t>
-            </a:r>
-          </a:p>
-          <a:p>
-            <a:pPr marL="742950" lvl="1" indent="-285750">
-              <a:buFont typeface="Courier New" panose="02070309020205020404" pitchFamily="49" charset="0"/>
-              <a:buChar char="o"/>
-            </a:pPr>
-            <a:r>
-              <a:rPr lang="de-DE"/>
-              <a:t>Simple comparision: gridsearch on 6 parameters with e.g. 10 distinct steps for each parameter means to try on </a:t>
-            </a:r>
-            <a:r>
-              <a:rPr lang="de-DE" b="1"/>
-              <a:t>10</a:t>
-            </a:r>
-            <a:r>
-              <a:rPr lang="de-DE" b="1" baseline="30000"/>
-              <a:t>6</a:t>
-            </a:r>
-            <a:r>
-              <a:rPr lang="de-DE" b="1"/>
-              <a:t> = 1.000.000 </a:t>
-            </a:r>
-            <a:r>
-              <a:rPr lang="de-DE"/>
-              <a:t>possible parameter settings.</a:t>
-            </a:r>
-          </a:p>
-          <a:p>
-            <a:pPr marL="742950" lvl="1" indent="-285750">
-              <a:buFont typeface="Courier New" panose="02070309020205020404" pitchFamily="49" charset="0"/>
-              <a:buChar char="o"/>
-            </a:pPr>
-            <a:r>
-              <a:rPr lang="de-DE"/>
-              <a:t>For gradient descent with e.g. 20 iterations on 6 parameters (up/down for each parameter individually) plus adjusted setting (all parameters adjusted simultaneously) requires 20 x (6 x 2 + 1) = </a:t>
-            </a:r>
-            <a:r>
-              <a:rPr lang="de-DE" b="1"/>
-              <a:t>260 possibilities</a:t>
-            </a:r>
-            <a:r>
-              <a:rPr lang="de-DE"/>
-              <a:t>.</a:t>
-            </a:r>
-          </a:p>
-        </p:txBody>
-      </p:sp>
-      <p:sp>
-        <p:nvSpPr>
-          <p:cNvPr id="6" name="Oval 5">
-            <a:extLst>
-              <a:ext uri="{FF2B5EF4-FFF2-40B4-BE49-F238E27FC236}">
-                <a16:creationId xmlns:a16="http://schemas.microsoft.com/office/drawing/2014/main" id="{B1A3A51F-8685-1941-88BA-0CEA7D6FC9B6}"/>
-              </a:ext>
-            </a:extLst>
-          </p:cNvPr>
-          <p:cNvSpPr/>
-          <p:nvPr/>
-        </p:nvSpPr>
-        <p:spPr>
-          <a:xfrm>
-            <a:off x="839141" y="1563130"/>
-            <a:ext cx="2138835" cy="1896762"/>
-          </a:xfrm>
-          <a:prstGeom prst="ellipse">
-            <a:avLst/>
-          </a:prstGeom>
-          <a:noFill/>
-          <a:ln w="25400">
-            <a:solidFill>
-              <a:srgbClr val="FF0000"/>
-            </a:solidFill>
-            <a:prstDash val="sysDot"/>
-          </a:ln>
-        </p:spPr>
-        <p:style>
-          <a:lnRef idx="2">
-            <a:schemeClr val="accent1">
-              <a:shade val="50000"/>
-            </a:schemeClr>
-          </a:lnRef>
-          <a:fillRef idx="1">
-            <a:schemeClr val="accent1"/>
-          </a:fillRef>
-          <a:effectRef idx="0">
-            <a:schemeClr val="accent1"/>
-          </a:effectRef>
-          <a:fontRef idx="minor">
-            <a:schemeClr val="lt1"/>
-          </a:fontRef>
-        </p:style>
-        <p:txBody>
-          <a:bodyPr rtlCol="0" anchor="ctr"/>
-          <a:lstStyle/>
-          <a:p>
-            <a:pPr algn="ctr"/>
-            <a:endParaRPr lang="de-DE"/>
-          </a:p>
-        </p:txBody>
-      </p:sp>
+              </a14:hiddenFill>
+            </a:ext>
+          </a:extLst>
+        </p:spPr>
+      </p:pic>
     </p:spTree>
     <p:extLst>
       <p:ext uri="{BB962C8B-B14F-4D97-AF65-F5344CB8AC3E}">
-        <p14:creationId xmlns:p14="http://schemas.microsoft.com/office/powerpoint/2010/main" val="714279291"/>
+        <p14:creationId xmlns:p14="http://schemas.microsoft.com/office/powerpoint/2010/main" val="1095352392"/>
       </p:ext>
     </p:extLst>
   </p:cSld>
@@ -15798,6 +16409,412 @@
             <a:fld id="{884D93BF-CEC1-484B-B797-4695C35961E3}" type="slidenum">
               <a:rPr lang="de-DE" smtClean="0"/>
               <a:t>7</a:t>
+            </a:fld>
+            <a:endParaRPr lang="de-DE"/>
+          </a:p>
+        </p:txBody>
+      </p:sp>
+      <p:sp>
+        <p:nvSpPr>
+          <p:cNvPr id="7" name="Textfeld 6">
+            <a:extLst>
+              <a:ext uri="{FF2B5EF4-FFF2-40B4-BE49-F238E27FC236}">
+                <a16:creationId xmlns:a16="http://schemas.microsoft.com/office/drawing/2014/main" id="{FF8A926B-8B78-834F-BFBA-9405321487C6}"/>
+              </a:ext>
+            </a:extLst>
+          </p:cNvPr>
+          <p:cNvSpPr txBox="1"/>
+          <p:nvPr/>
+        </p:nvSpPr>
+        <p:spPr>
+          <a:xfrm>
+            <a:off x="365769" y="302411"/>
+            <a:ext cx="6674128" cy="461665"/>
+          </a:xfrm>
+          <a:prstGeom prst="rect">
+            <a:avLst/>
+          </a:prstGeom>
+          <a:noFill/>
+        </p:spPr>
+        <p:txBody>
+          <a:bodyPr wrap="square" rtlCol="0">
+            <a:spAutoFit/>
+          </a:bodyPr>
+          <a:lstStyle/>
+          <a:p>
+            <a:r>
+              <a:rPr lang="de-DE" sz="2400" b="1" dirty="0"/>
+              <a:t>El Ni</a:t>
+            </a:r>
+            <a:r>
+              <a:rPr lang="de-DE" sz="2400" b="1" dirty="0" err="1"/>
+              <a:t>ñ</a:t>
+            </a:r>
+            <a:r>
+              <a:rPr lang="de-DE" sz="2400" b="1" dirty="0"/>
+              <a:t>o Southern Oscillation </a:t>
+            </a:r>
+            <a:r>
+              <a:rPr lang="de-DE" sz="2400" dirty="0"/>
+              <a:t>(ENSO)</a:t>
+            </a:r>
+            <a:endParaRPr lang="de-DE" sz="2400" b="1" dirty="0"/>
+          </a:p>
+        </p:txBody>
+      </p:sp>
+      <p:sp>
+        <p:nvSpPr>
+          <p:cNvPr id="5" name="Textfeld 4">
+            <a:extLst>
+              <a:ext uri="{FF2B5EF4-FFF2-40B4-BE49-F238E27FC236}">
+                <a16:creationId xmlns:a16="http://schemas.microsoft.com/office/drawing/2014/main" id="{7B349DC1-8020-704C-A9A0-4D7FFCADBAC0}"/>
+              </a:ext>
+            </a:extLst>
+          </p:cNvPr>
+          <p:cNvSpPr txBox="1"/>
+          <p:nvPr/>
+        </p:nvSpPr>
+        <p:spPr>
+          <a:xfrm>
+            <a:off x="543697" y="1112108"/>
+            <a:ext cx="11204958" cy="3970318"/>
+          </a:xfrm>
+          <a:prstGeom prst="rect">
+            <a:avLst/>
+          </a:prstGeom>
+          <a:noFill/>
+        </p:spPr>
+        <p:txBody>
+          <a:bodyPr wrap="square" rtlCol="0">
+            <a:spAutoFit/>
+          </a:bodyPr>
+          <a:lstStyle/>
+          <a:p>
+            <a:pPr marL="285750" indent="-285750">
+              <a:buFont typeface="Arial" panose="020B0604020202020204" pitchFamily="34" charset="0"/>
+              <a:buChar char="•"/>
+            </a:pPr>
+            <a:r>
+              <a:rPr lang="de-DE"/>
+              <a:t>Work with </a:t>
+            </a:r>
+            <a:r>
+              <a:rPr lang="de-DE" b="1"/>
+              <a:t>un-scaled ENSO index </a:t>
+            </a:r>
+            <a:r>
+              <a:rPr lang="de-DE"/>
+              <a:t>and stick to </a:t>
+            </a:r>
+            <a:r>
+              <a:rPr lang="de-DE" b="1"/>
+              <a:t>‚sigmoid‘ activation</a:t>
+            </a:r>
+            <a:r>
+              <a:rPr lang="de-DE"/>
+              <a:t>.</a:t>
+            </a:r>
+          </a:p>
+          <a:p>
+            <a:pPr marL="285750" indent="-285750">
+              <a:buFont typeface="Arial" panose="020B0604020202020204" pitchFamily="34" charset="0"/>
+              <a:buChar char="•"/>
+            </a:pPr>
+            <a:r>
+              <a:rPr lang="de-DE"/>
+              <a:t>Still have many (hyper-)</a:t>
+            </a:r>
+            <a:r>
+              <a:rPr lang="de-DE" b="1"/>
+              <a:t>parameters</a:t>
+            </a:r>
+            <a:r>
+              <a:rPr lang="de-DE"/>
+              <a:t> to be optimized:</a:t>
+            </a:r>
+          </a:p>
+          <a:p>
+            <a:pPr marL="742950" lvl="1" indent="-285750">
+              <a:buFont typeface="Courier New" panose="02070309020205020404" pitchFamily="49" charset="0"/>
+              <a:buChar char="o"/>
+            </a:pPr>
+            <a:r>
+              <a:rPr lang="de-DE" b="1"/>
+              <a:t>input_length</a:t>
+            </a:r>
+            <a:r>
+              <a:rPr lang="de-DE"/>
+              <a:t>: Number of timesteps per input sample.</a:t>
+            </a:r>
+          </a:p>
+          <a:p>
+            <a:pPr marL="742950" lvl="1" indent="-285750">
+              <a:buFont typeface="Courier New" panose="02070309020205020404" pitchFamily="49" charset="0"/>
+              <a:buChar char="o"/>
+            </a:pPr>
+            <a:r>
+              <a:rPr lang="de-DE" b="1"/>
+              <a:t>n_res</a:t>
+            </a:r>
+            <a:r>
+              <a:rPr lang="de-DE"/>
+              <a:t>: Number of reservoir units.</a:t>
+            </a:r>
+          </a:p>
+          <a:p>
+            <a:pPr marL="742950" lvl="1" indent="-285750">
+              <a:buFont typeface="Courier New" panose="02070309020205020404" pitchFamily="49" charset="0"/>
+              <a:buChar char="o"/>
+            </a:pPr>
+            <a:r>
+              <a:rPr lang="de-DE" b="1"/>
+              <a:t>W_in_lim</a:t>
+            </a:r>
+            <a:r>
+              <a:rPr lang="de-DE"/>
+              <a:t>: Initialize input weights from random distribution in [-W_in_lim, +W_in_lim]</a:t>
+            </a:r>
+          </a:p>
+          <a:p>
+            <a:pPr marL="742950" lvl="1" indent="-285750">
+              <a:buFont typeface="Courier New" panose="02070309020205020404" pitchFamily="49" charset="0"/>
+              <a:buChar char="o"/>
+            </a:pPr>
+            <a:r>
+              <a:rPr lang="de-DE" b="1"/>
+              <a:t>leak_rate</a:t>
+            </a:r>
+            <a:r>
+              <a:rPr lang="de-DE"/>
+              <a:t>: Leak rate used in transition function of reservoir states.</a:t>
+            </a:r>
+          </a:p>
+          <a:p>
+            <a:pPr marL="742950" lvl="1" indent="-285750">
+              <a:buFont typeface="Courier New" panose="02070309020205020404" pitchFamily="49" charset="0"/>
+              <a:buChar char="o"/>
+            </a:pPr>
+            <a:r>
+              <a:rPr lang="de-DE" b="1"/>
+              <a:t>spec_radius</a:t>
+            </a:r>
+            <a:r>
+              <a:rPr lang="de-DE"/>
+              <a:t>: Spectral radius, becomes largest Eigenvalue of reservoir weight matrix</a:t>
+            </a:r>
+          </a:p>
+          <a:p>
+            <a:pPr marL="742950" lvl="1" indent="-285750">
+              <a:buFont typeface="Courier New" panose="02070309020205020404" pitchFamily="49" charset="0"/>
+              <a:buChar char="o"/>
+            </a:pPr>
+            <a:r>
+              <a:rPr lang="de-DE" b="1"/>
+              <a:t>sparsity</a:t>
+            </a:r>
+            <a:r>
+              <a:rPr lang="de-DE"/>
+              <a:t>: Sparsity of reservoir weight matrix.</a:t>
+            </a:r>
+          </a:p>
+          <a:p>
+            <a:pPr marL="742950" lvl="1" indent="-285750">
+              <a:buFont typeface="Courier New" panose="02070309020205020404" pitchFamily="49" charset="0"/>
+              <a:buChar char="o"/>
+            </a:pPr>
+            <a:endParaRPr lang="de-DE"/>
+          </a:p>
+          <a:p>
+            <a:pPr marL="285750" indent="-285750">
+              <a:buFont typeface="Arial" panose="020B0604020202020204" pitchFamily="34" charset="0"/>
+              <a:buChar char="•"/>
+            </a:pPr>
+            <a:r>
+              <a:rPr lang="de-DE"/>
+              <a:t>Instead of </a:t>
+            </a:r>
+            <a:r>
+              <a:rPr lang="de-DE" b="1"/>
+              <a:t>gridsearch</a:t>
+            </a:r>
+            <a:r>
+              <a:rPr lang="de-DE"/>
+              <a:t>, use some form of </a:t>
+            </a:r>
+            <a:r>
+              <a:rPr lang="de-DE" b="1">
+                <a:solidFill>
+                  <a:srgbClr val="0070C0"/>
+                </a:solidFill>
+              </a:rPr>
+              <a:t>gradient descent </a:t>
+            </a:r>
+            <a:r>
+              <a:rPr lang="de-DE"/>
+              <a:t>to find optimal parameters </a:t>
+            </a:r>
+            <a:r>
+              <a:rPr lang="de-DE">
+                <a:solidFill>
+                  <a:srgbClr val="0070C0"/>
+                </a:solidFill>
+              </a:rPr>
+              <a:t>for specified target_length.</a:t>
+            </a:r>
+          </a:p>
+          <a:p>
+            <a:pPr marL="742950" lvl="1" indent="-285750">
+              <a:buFont typeface="Courier New" panose="02070309020205020404" pitchFamily="49" charset="0"/>
+              <a:buChar char="o"/>
+            </a:pPr>
+            <a:r>
+              <a:rPr lang="de-DE"/>
+              <a:t>Simple comparision: gridsearch on 6 parameters with e.g. 10 distinct steps for each parameter means to try on </a:t>
+            </a:r>
+            <a:r>
+              <a:rPr lang="de-DE" b="1"/>
+              <a:t>10</a:t>
+            </a:r>
+            <a:r>
+              <a:rPr lang="de-DE" b="1" baseline="30000"/>
+              <a:t>6</a:t>
+            </a:r>
+            <a:r>
+              <a:rPr lang="de-DE" b="1"/>
+              <a:t> = 1.000.000 </a:t>
+            </a:r>
+            <a:r>
+              <a:rPr lang="de-DE"/>
+              <a:t>possible parameter settings.</a:t>
+            </a:r>
+          </a:p>
+          <a:p>
+            <a:pPr marL="742950" lvl="1" indent="-285750">
+              <a:buFont typeface="Courier New" panose="02070309020205020404" pitchFamily="49" charset="0"/>
+              <a:buChar char="o"/>
+            </a:pPr>
+            <a:r>
+              <a:rPr lang="de-DE"/>
+              <a:t>For gradient descent with e.g. 20 iterations on 6 parameters (up/down for each parameter individually) plus adjusted setting (all parameters adjusted simultaneously) requires 20 x (6 x 2 + 1) = </a:t>
+            </a:r>
+            <a:r>
+              <a:rPr lang="de-DE" b="1"/>
+              <a:t>260 possibilities</a:t>
+            </a:r>
+            <a:r>
+              <a:rPr lang="de-DE"/>
+              <a:t>.</a:t>
+            </a:r>
+          </a:p>
+        </p:txBody>
+      </p:sp>
+      <p:sp>
+        <p:nvSpPr>
+          <p:cNvPr id="6" name="Oval 5">
+            <a:extLst>
+              <a:ext uri="{FF2B5EF4-FFF2-40B4-BE49-F238E27FC236}">
+                <a16:creationId xmlns:a16="http://schemas.microsoft.com/office/drawing/2014/main" id="{B1A3A51F-8685-1941-88BA-0CEA7D6FC9B6}"/>
+              </a:ext>
+            </a:extLst>
+          </p:cNvPr>
+          <p:cNvSpPr/>
+          <p:nvPr/>
+        </p:nvSpPr>
+        <p:spPr>
+          <a:xfrm>
+            <a:off x="839141" y="1563130"/>
+            <a:ext cx="2138835" cy="1896762"/>
+          </a:xfrm>
+          <a:prstGeom prst="ellipse">
+            <a:avLst/>
+          </a:prstGeom>
+          <a:noFill/>
+          <a:ln w="25400">
+            <a:solidFill>
+              <a:srgbClr val="FF0000"/>
+            </a:solidFill>
+            <a:prstDash val="sysDot"/>
+          </a:ln>
+        </p:spPr>
+        <p:style>
+          <a:lnRef idx="2">
+            <a:schemeClr val="accent1">
+              <a:shade val="50000"/>
+            </a:schemeClr>
+          </a:lnRef>
+          <a:fillRef idx="1">
+            <a:schemeClr val="accent1"/>
+          </a:fillRef>
+          <a:effectRef idx="0">
+            <a:schemeClr val="accent1"/>
+          </a:effectRef>
+          <a:fontRef idx="minor">
+            <a:schemeClr val="lt1"/>
+          </a:fontRef>
+        </p:style>
+        <p:txBody>
+          <a:bodyPr rtlCol="0" anchor="ctr"/>
+          <a:lstStyle/>
+          <a:p>
+            <a:pPr algn="ctr"/>
+            <a:endParaRPr lang="de-DE"/>
+          </a:p>
+        </p:txBody>
+      </p:sp>
+    </p:spTree>
+    <p:extLst>
+      <p:ext uri="{BB962C8B-B14F-4D97-AF65-F5344CB8AC3E}">
+        <p14:creationId xmlns:p14="http://schemas.microsoft.com/office/powerpoint/2010/main" val="714279291"/>
+      </p:ext>
+    </p:extLst>
+  </p:cSld>
+  <p:clrMapOvr>
+    <a:masterClrMapping/>
+  </p:clrMapOvr>
+</p:sld>
+</file>
+
+<file path=ppt/slides/slide8.xml><?xml version="1.0" encoding="utf-8"?>
+<p:sld xmlns:a="http://schemas.openxmlformats.org/drawingml/2006/main" xmlns:r="http://schemas.openxmlformats.org/officeDocument/2006/relationships" xmlns:p="http://schemas.openxmlformats.org/presentationml/2006/main">
+  <p:cSld>
+    <p:spTree>
+      <p:nvGrpSpPr>
+        <p:cNvPr id="1" name=""/>
+        <p:cNvGrpSpPr/>
+        <p:nvPr/>
+      </p:nvGrpSpPr>
+      <p:grpSpPr>
+        <a:xfrm>
+          <a:off x="0" y="0"/>
+          <a:ext cx="0" cy="0"/>
+          <a:chOff x="0" y="0"/>
+          <a:chExt cx="0" cy="0"/>
+        </a:xfrm>
+      </p:grpSpPr>
+      <p:sp>
+        <p:nvSpPr>
+          <p:cNvPr id="4" name="Foliennummernplatzhalter 3">
+            <a:extLst>
+              <a:ext uri="{FF2B5EF4-FFF2-40B4-BE49-F238E27FC236}">
+                <a16:creationId xmlns:a16="http://schemas.microsoft.com/office/drawing/2014/main" id="{9752BF9B-20ED-124C-8D78-032D3F29C212}"/>
+              </a:ext>
+            </a:extLst>
+          </p:cNvPr>
+          <p:cNvSpPr>
+            <a:spLocks noGrp="1"/>
+          </p:cNvSpPr>
+          <p:nvPr>
+            <p:ph type="sldNum" sz="quarter" idx="12"/>
+          </p:nvPr>
+        </p:nvSpPr>
+        <p:spPr/>
+        <p:txBody>
+          <a:bodyPr/>
+          <a:lstStyle/>
+          <a:p>
+            <a:fld id="{884D93BF-CEC1-484B-B797-4695C35961E3}" type="slidenum">
+              <a:rPr lang="de-DE" smtClean="0"/>
+              <a:t>8</a:t>
             </a:fld>
             <a:endParaRPr lang="de-DE"/>
           </a:p>
@@ -17060,247 +18077,6 @@
 </p:sld>
 </file>
 
-<file path=ppt/slides/slide8.xml><?xml version="1.0" encoding="utf-8"?>
-<p:sld xmlns:a="http://schemas.openxmlformats.org/drawingml/2006/main" xmlns:r="http://schemas.openxmlformats.org/officeDocument/2006/relationships" xmlns:p="http://schemas.openxmlformats.org/presentationml/2006/main">
-  <p:cSld>
-    <p:spTree>
-      <p:nvGrpSpPr>
-        <p:cNvPr id="1" name=""/>
-        <p:cNvGrpSpPr/>
-        <p:nvPr/>
-      </p:nvGrpSpPr>
-      <p:grpSpPr>
-        <a:xfrm>
-          <a:off x="0" y="0"/>
-          <a:ext cx="0" cy="0"/>
-          <a:chOff x="0" y="0"/>
-          <a:chExt cx="0" cy="0"/>
-        </a:xfrm>
-      </p:grpSpPr>
-      <p:sp>
-        <p:nvSpPr>
-          <p:cNvPr id="4" name="Foliennummernplatzhalter 3">
-            <a:extLst>
-              <a:ext uri="{FF2B5EF4-FFF2-40B4-BE49-F238E27FC236}">
-                <a16:creationId xmlns:a16="http://schemas.microsoft.com/office/drawing/2014/main" id="{9752BF9B-20ED-124C-8D78-032D3F29C212}"/>
-              </a:ext>
-            </a:extLst>
-          </p:cNvPr>
-          <p:cNvSpPr>
-            <a:spLocks noGrp="1"/>
-          </p:cNvSpPr>
-          <p:nvPr>
-            <p:ph type="sldNum" sz="quarter" idx="12"/>
-          </p:nvPr>
-        </p:nvSpPr>
-        <p:spPr/>
-        <p:txBody>
-          <a:bodyPr/>
-          <a:lstStyle/>
-          <a:p>
-            <a:fld id="{884D93BF-CEC1-484B-B797-4695C35961E3}" type="slidenum">
-              <a:rPr lang="de-DE" smtClean="0"/>
-              <a:t>8</a:t>
-            </a:fld>
-            <a:endParaRPr lang="de-DE"/>
-          </a:p>
-        </p:txBody>
-      </p:sp>
-      <p:sp>
-        <p:nvSpPr>
-          <p:cNvPr id="6" name="Textfeld 5">
-            <a:extLst>
-              <a:ext uri="{FF2B5EF4-FFF2-40B4-BE49-F238E27FC236}">
-                <a16:creationId xmlns:a16="http://schemas.microsoft.com/office/drawing/2014/main" id="{0FDFCF38-2125-FC44-8DC7-B38812BE71CF}"/>
-              </a:ext>
-            </a:extLst>
-          </p:cNvPr>
-          <p:cNvSpPr txBox="1"/>
-          <p:nvPr/>
-        </p:nvSpPr>
-        <p:spPr>
-          <a:xfrm>
-            <a:off x="341845" y="83130"/>
-            <a:ext cx="7988523" cy="830997"/>
-          </a:xfrm>
-          <a:prstGeom prst="rect">
-            <a:avLst/>
-          </a:prstGeom>
-          <a:noFill/>
-        </p:spPr>
-        <p:txBody>
-          <a:bodyPr wrap="square" rtlCol="0">
-            <a:spAutoFit/>
-          </a:bodyPr>
-          <a:lstStyle/>
-          <a:p>
-            <a:r>
-              <a:rPr lang="de-DE" sz="2400" b="1" dirty="0"/>
-              <a:t>Evaluation metrics and accuracy for base ESN on ENSO index</a:t>
-            </a:r>
-          </a:p>
-          <a:p>
-            <a:r>
-              <a:rPr lang="de-DE" sz="2400" dirty="0"/>
-              <a:t>optimized (hyper-)parameters*</a:t>
-            </a:r>
-            <a:r>
-              <a:rPr lang="de-DE" sz="2400" baseline="30000" dirty="0"/>
-              <a:t>)</a:t>
-            </a:r>
-          </a:p>
-        </p:txBody>
-      </p:sp>
-      <p:pic>
-        <p:nvPicPr>
-          <p:cNvPr id="1030" name="Picture 6">
-            <a:extLst>
-              <a:ext uri="{FF2B5EF4-FFF2-40B4-BE49-F238E27FC236}">
-                <a16:creationId xmlns:a16="http://schemas.microsoft.com/office/drawing/2014/main" id="{A6B501B5-7ADA-844D-B47D-4A3728B51C8B}"/>
-              </a:ext>
-            </a:extLst>
-          </p:cNvPr>
-          <p:cNvPicPr>
-            <a:picLocks noChangeAspect="1" noChangeArrowheads="1"/>
-          </p:cNvPicPr>
-          <p:nvPr/>
-        </p:nvPicPr>
-        <p:blipFill>
-          <a:blip r:embed="rId2">
-            <a:extLst>
-              <a:ext uri="{28A0092B-C50C-407E-A947-70E740481C1C}">
-                <a14:useLocalDpi xmlns:a14="http://schemas.microsoft.com/office/drawing/2010/main" val="0"/>
-              </a:ext>
-            </a:extLst>
-          </a:blip>
-          <a:srcRect/>
-          <a:stretch>
-            <a:fillRect/>
-          </a:stretch>
-        </p:blipFill>
-        <p:spPr bwMode="auto">
-          <a:xfrm>
-            <a:off x="5177482" y="1125522"/>
-            <a:ext cx="6524565" cy="5697619"/>
-          </a:xfrm>
-          <a:prstGeom prst="rect">
-            <a:avLst/>
-          </a:prstGeom>
-          <a:noFill/>
-          <a:extLst>
-            <a:ext uri="{909E8E84-426E-40DD-AFC4-6F175D3DCCD1}">
-              <a14:hiddenFill xmlns:a14="http://schemas.microsoft.com/office/drawing/2010/main">
-                <a:solidFill>
-                  <a:srgbClr val="FFFFFF"/>
-                </a:solidFill>
-              </a14:hiddenFill>
-            </a:ext>
-          </a:extLst>
-        </p:spPr>
-      </p:pic>
-      <p:pic>
-        <p:nvPicPr>
-          <p:cNvPr id="1032" name="Picture 8">
-            <a:extLst>
-              <a:ext uri="{FF2B5EF4-FFF2-40B4-BE49-F238E27FC236}">
-                <a16:creationId xmlns:a16="http://schemas.microsoft.com/office/drawing/2014/main" id="{6779A9E9-B3C9-6548-BB6B-7960F593A475}"/>
-              </a:ext>
-            </a:extLst>
-          </p:cNvPr>
-          <p:cNvPicPr>
-            <a:picLocks noChangeAspect="1" noChangeArrowheads="1"/>
-          </p:cNvPicPr>
-          <p:nvPr/>
-        </p:nvPicPr>
-        <p:blipFill>
-          <a:blip r:embed="rId3">
-            <a:extLst>
-              <a:ext uri="{28A0092B-C50C-407E-A947-70E740481C1C}">
-                <a14:useLocalDpi xmlns:a14="http://schemas.microsoft.com/office/drawing/2010/main" val="0"/>
-              </a:ext>
-            </a:extLst>
-          </a:blip>
-          <a:srcRect/>
-          <a:stretch>
-            <a:fillRect/>
-          </a:stretch>
-        </p:blipFill>
-        <p:spPr bwMode="auto">
-          <a:xfrm>
-            <a:off x="0" y="1090664"/>
-            <a:ext cx="4930992" cy="5732477"/>
-          </a:xfrm>
-          <a:prstGeom prst="rect">
-            <a:avLst/>
-          </a:prstGeom>
-          <a:noFill/>
-          <a:extLst>
-            <a:ext uri="{909E8E84-426E-40DD-AFC4-6F175D3DCCD1}">
-              <a14:hiddenFill xmlns:a14="http://schemas.microsoft.com/office/drawing/2010/main">
-                <a:solidFill>
-                  <a:srgbClr val="FFFFFF"/>
-                </a:solidFill>
-              </a14:hiddenFill>
-            </a:ext>
-          </a:extLst>
-        </p:spPr>
-      </p:pic>
-      <p:sp>
-        <p:nvSpPr>
-          <p:cNvPr id="3" name="Textfeld 2">
-            <a:extLst>
-              <a:ext uri="{FF2B5EF4-FFF2-40B4-BE49-F238E27FC236}">
-                <a16:creationId xmlns:a16="http://schemas.microsoft.com/office/drawing/2014/main" id="{CEEB9F21-C237-B747-B3F7-9F39D06967DE}"/>
-              </a:ext>
-            </a:extLst>
-          </p:cNvPr>
-          <p:cNvSpPr txBox="1"/>
-          <p:nvPr/>
-        </p:nvSpPr>
-        <p:spPr>
-          <a:xfrm>
-            <a:off x="10538255" y="66742"/>
-            <a:ext cx="1653746" cy="307777"/>
-          </a:xfrm>
-          <a:prstGeom prst="rect">
-            <a:avLst/>
-          </a:prstGeom>
-          <a:noFill/>
-        </p:spPr>
-        <p:txBody>
-          <a:bodyPr wrap="square" rtlCol="0">
-            <a:spAutoFit/>
-          </a:bodyPr>
-          <a:lstStyle/>
-          <a:p>
-            <a:r>
-              <a:rPr lang="de-DE" sz="1400"/>
-              <a:t>*</a:t>
-            </a:r>
-            <a:r>
-              <a:rPr lang="de-DE" sz="1400" baseline="30000"/>
-              <a:t>)</a:t>
-            </a:r>
-            <a:r>
-              <a:rPr lang="de-DE" sz="1400"/>
-              <a:t> slightly modified</a:t>
-            </a:r>
-          </a:p>
-        </p:txBody>
-      </p:sp>
-    </p:spTree>
-    <p:extLst>
-      <p:ext uri="{BB962C8B-B14F-4D97-AF65-F5344CB8AC3E}">
-        <p14:creationId xmlns:p14="http://schemas.microsoft.com/office/powerpoint/2010/main" val="1638817599"/>
-      </p:ext>
-    </p:extLst>
-  </p:cSld>
-  <p:clrMapOvr>
-    <a:masterClrMapping/>
-  </p:clrMapOvr>
-</p:sld>
-</file>
-
 <file path=ppt/slides/slide9.xml><?xml version="1.0" encoding="utf-8"?>
 <p:sld xmlns:a="http://schemas.openxmlformats.org/drawingml/2006/main" xmlns:r="http://schemas.openxmlformats.org/officeDocument/2006/relationships" xmlns:p="http://schemas.openxmlformats.org/presentationml/2006/main">
   <p:cSld>
@@ -17320,35 +18096,6 @@
       </p:grpSpPr>
       <p:sp>
         <p:nvSpPr>
-          <p:cNvPr id="4" name="Foliennummernplatzhalter 3">
-            <a:extLst>
-              <a:ext uri="{FF2B5EF4-FFF2-40B4-BE49-F238E27FC236}">
-                <a16:creationId xmlns:a16="http://schemas.microsoft.com/office/drawing/2014/main" id="{9752BF9B-20ED-124C-8D78-032D3F29C212}"/>
-              </a:ext>
-            </a:extLst>
-          </p:cNvPr>
-          <p:cNvSpPr>
-            <a:spLocks noGrp="1"/>
-          </p:cNvSpPr>
-          <p:nvPr>
-            <p:ph type="sldNum" sz="quarter" idx="12"/>
-          </p:nvPr>
-        </p:nvSpPr>
-        <p:spPr/>
-        <p:txBody>
-          <a:bodyPr/>
-          <a:lstStyle/>
-          <a:p>
-            <a:fld id="{884D93BF-CEC1-484B-B797-4695C35961E3}" type="slidenum">
-              <a:rPr lang="de-DE" smtClean="0"/>
-              <a:t>9</a:t>
-            </a:fld>
-            <a:endParaRPr lang="de-DE"/>
-          </a:p>
-        </p:txBody>
-      </p:sp>
-      <p:sp>
-        <p:nvSpPr>
           <p:cNvPr id="6" name="Textfeld 5">
             <a:extLst>
               <a:ext uri="{FF2B5EF4-FFF2-40B4-BE49-F238E27FC236}">
@@ -17377,27 +18124,40 @@
           <a:p>
             <a:r>
               <a:rPr lang="de-DE" sz="2400" b="1" dirty="0"/>
-              <a:t>Evaluation metrics and accuracy for base ESN on ENSO index</a:t>
-            </a:r>
-          </a:p>
-          <a:p>
-            <a:r>
-              <a:rPr lang="de-DE" sz="2400" dirty="0"/>
-              <a:t>optimized (hyper-)parameters*</a:t>
-            </a:r>
-            <a:r>
-              <a:rPr lang="de-DE" sz="2400" baseline="30000" dirty="0"/>
-              <a:t>)</a:t>
-            </a:r>
+              <a:t>Fidelity check for base ESN on ENSO index</a:t>
+            </a:r>
+          </a:p>
+          <a:p>
+            <a:r>
+              <a:rPr lang="de-DE" sz="2400" dirty="0">
+                <a:solidFill>
+                  <a:srgbClr val="FF0000"/>
+                </a:solidFill>
+              </a:rPr>
+              <a:t>target_length = </a:t>
+            </a:r>
+            <a:r>
+              <a:rPr lang="de-DE" sz="2400" b="1" dirty="0">
+                <a:solidFill>
+                  <a:srgbClr val="FF0000"/>
+                </a:solidFill>
+              </a:rPr>
+              <a:t>1 month</a:t>
+            </a:r>
+            <a:endParaRPr lang="de-DE" sz="2400" b="1" baseline="30000" dirty="0">
+              <a:solidFill>
+                <a:srgbClr val="FF0000"/>
+              </a:solidFill>
+            </a:endParaRPr>
           </a:p>
         </p:txBody>
       </p:sp>
       <p:pic>
         <p:nvPicPr>
-          <p:cNvPr id="1030" name="Picture 6">
-            <a:extLst>
-              <a:ext uri="{FF2B5EF4-FFF2-40B4-BE49-F238E27FC236}">
-                <a16:creationId xmlns:a16="http://schemas.microsoft.com/office/drawing/2014/main" id="{A6B501B5-7ADA-844D-B47D-4A3728B51C8B}"/>
+          <p:cNvPr id="3074" name="Picture 2">
+            <a:extLst>
+              <a:ext uri="{FF2B5EF4-FFF2-40B4-BE49-F238E27FC236}">
+                <a16:creationId xmlns:a16="http://schemas.microsoft.com/office/drawing/2014/main" id="{D66DD9C0-7240-C148-863F-004E5A3BA6FD}"/>
               </a:ext>
             </a:extLst>
           </p:cNvPr>
@@ -17421,8 +18181,8 @@
         </p:blipFill>
         <p:spPr bwMode="auto">
           <a:xfrm>
-            <a:off x="5177482" y="1125522"/>
-            <a:ext cx="6524565" cy="5697619"/>
+            <a:off x="3100385" y="1605893"/>
+            <a:ext cx="8751887" cy="4639332"/>
           </a:xfrm>
           <a:prstGeom prst="rect">
             <a:avLst/>
@@ -17441,100 +18201,40 @@
       </p:pic>
       <p:pic>
         <p:nvPicPr>
-          <p:cNvPr id="1032" name="Picture 8">
-            <a:extLst>
-              <a:ext uri="{FF2B5EF4-FFF2-40B4-BE49-F238E27FC236}">
-                <a16:creationId xmlns:a16="http://schemas.microsoft.com/office/drawing/2014/main" id="{6779A9E9-B3C9-6548-BB6B-7960F593A475}"/>
+          <p:cNvPr id="5" name="Grafik 4">
+            <a:extLst>
+              <a:ext uri="{FF2B5EF4-FFF2-40B4-BE49-F238E27FC236}">
+                <a16:creationId xmlns:a16="http://schemas.microsoft.com/office/drawing/2014/main" id="{08E8A813-63A1-124A-97AF-796E0E484018}"/>
               </a:ext>
             </a:extLst>
           </p:cNvPr>
           <p:cNvPicPr>
-            <a:picLocks noChangeAspect="1" noChangeArrowheads="1"/>
+            <a:picLocks noChangeAspect="1"/>
           </p:cNvPicPr>
           <p:nvPr/>
         </p:nvPicPr>
         <p:blipFill>
-          <a:blip r:embed="rId3">
-            <a:extLst>
-              <a:ext uri="{28A0092B-C50C-407E-A947-70E740481C1C}">
-                <a14:useLocalDpi xmlns:a14="http://schemas.microsoft.com/office/drawing/2010/main" val="0"/>
-              </a:ext>
-            </a:extLst>
-          </a:blip>
-          <a:srcRect/>
+          <a:blip r:embed="rId3"/>
           <a:stretch>
             <a:fillRect/>
           </a:stretch>
         </p:blipFill>
-        <p:spPr bwMode="auto">
-          <a:xfrm>
-            <a:off x="0" y="1090664"/>
-            <a:ext cx="4930992" cy="5732477"/>
+        <p:spPr>
+          <a:xfrm>
+            <a:off x="296864" y="2287423"/>
+            <a:ext cx="2595240" cy="2283154"/>
           </a:xfrm>
           <a:prstGeom prst="rect">
             <a:avLst/>
           </a:prstGeom>
-          <a:noFill/>
-          <a:extLst>
-            <a:ext uri="{909E8E84-426E-40DD-AFC4-6F175D3DCCD1}">
-              <a14:hiddenFill xmlns:a14="http://schemas.microsoft.com/office/drawing/2010/main">
-                <a:solidFill>
-                  <a:srgbClr val="FFFFFF"/>
-                </a:solidFill>
-              </a14:hiddenFill>
-            </a:ext>
-          </a:extLst>
         </p:spPr>
       </p:pic>
       <p:sp>
         <p:nvSpPr>
-          <p:cNvPr id="3" name="Textfeld 2">
-            <a:extLst>
-              <a:ext uri="{FF2B5EF4-FFF2-40B4-BE49-F238E27FC236}">
-                <a16:creationId xmlns:a16="http://schemas.microsoft.com/office/drawing/2014/main" id="{CEEB9F21-C237-B747-B3F7-9F39D06967DE}"/>
-              </a:ext>
-            </a:extLst>
-          </p:cNvPr>
-          <p:cNvSpPr txBox="1"/>
-          <p:nvPr/>
-        </p:nvSpPr>
-        <p:spPr>
-          <a:xfrm>
-            <a:off x="10538255" y="66742"/>
-            <a:ext cx="1653746" cy="307777"/>
-          </a:xfrm>
-          <a:prstGeom prst="rect">
-            <a:avLst/>
-          </a:prstGeom>
-          <a:noFill/>
-        </p:spPr>
-        <p:txBody>
-          <a:bodyPr wrap="square" rtlCol="0">
-            <a:spAutoFit/>
-          </a:bodyPr>
-          <a:lstStyle/>
-          <a:p>
-            <a:r>
-              <a:rPr lang="de-DE" sz="1400"/>
-              <a:t>*</a:t>
-            </a:r>
-            <a:r>
-              <a:rPr lang="de-DE" sz="1400" baseline="30000"/>
-              <a:t>)</a:t>
-            </a:r>
-            <a:r>
-              <a:rPr lang="de-DE" sz="1400"/>
-              <a:t> slightly modified</a:t>
-            </a:r>
-          </a:p>
-        </p:txBody>
-      </p:sp>
-      <p:sp>
-        <p:nvSpPr>
-          <p:cNvPr id="2" name="Oval 1">
-            <a:extLst>
-              <a:ext uri="{FF2B5EF4-FFF2-40B4-BE49-F238E27FC236}">
-                <a16:creationId xmlns:a16="http://schemas.microsoft.com/office/drawing/2014/main" id="{BB1C868E-01A4-3640-81E6-9CE23CD60717}"/>
+          <p:cNvPr id="19" name="Oval 18">
+            <a:extLst>
+              <a:ext uri="{FF2B5EF4-FFF2-40B4-BE49-F238E27FC236}">
+                <a16:creationId xmlns:a16="http://schemas.microsoft.com/office/drawing/2014/main" id="{8B7D014A-64E3-154D-B649-B8B8B2992827}"/>
               </a:ext>
             </a:extLst>
           </p:cNvPr>
@@ -17543,8 +18243,8 @@
         </p:nvSpPr>
         <p:spPr>
           <a:xfrm>
-            <a:off x="5437229" y="1665130"/>
-            <a:ext cx="1260390" cy="580767"/>
+            <a:off x="1240569" y="2593465"/>
+            <a:ext cx="1202594" cy="549786"/>
           </a:xfrm>
           <a:prstGeom prst="ellipse">
             <a:avLst/>
@@ -17582,555 +18282,10 @@
           </a:p>
         </p:txBody>
       </p:sp>
-      <p:sp>
-        <p:nvSpPr>
-          <p:cNvPr id="8" name="Oval 7">
-            <a:extLst>
-              <a:ext uri="{FF2B5EF4-FFF2-40B4-BE49-F238E27FC236}">
-                <a16:creationId xmlns:a16="http://schemas.microsoft.com/office/drawing/2014/main" id="{94536BFD-35CF-DC44-8271-8B74723C9FA4}"/>
-              </a:ext>
-            </a:extLst>
-          </p:cNvPr>
-          <p:cNvSpPr/>
-          <p:nvPr/>
-        </p:nvSpPr>
-        <p:spPr>
-          <a:xfrm>
-            <a:off x="7600157" y="1665129"/>
-            <a:ext cx="1260390" cy="580767"/>
-          </a:xfrm>
-          <a:prstGeom prst="ellipse">
-            <a:avLst/>
-          </a:prstGeom>
-          <a:noFill/>
-          <a:ln w="25400">
-            <a:solidFill>
-              <a:srgbClr val="FF0000"/>
-            </a:solidFill>
-            <a:prstDash val="sysDot"/>
-          </a:ln>
-        </p:spPr>
-        <p:style>
-          <a:lnRef idx="2">
-            <a:schemeClr val="accent1">
-              <a:shade val="50000"/>
-            </a:schemeClr>
-          </a:lnRef>
-          <a:fillRef idx="1">
-            <a:schemeClr val="accent1"/>
-          </a:fillRef>
-          <a:effectRef idx="0">
-            <a:schemeClr val="accent1"/>
-          </a:effectRef>
-          <a:fontRef idx="minor">
-            <a:schemeClr val="lt1"/>
-          </a:fontRef>
-        </p:style>
-        <p:txBody>
-          <a:bodyPr rtlCol="0" anchor="ctr"/>
-          <a:lstStyle/>
-          <a:p>
-            <a:pPr algn="ctr"/>
-            <a:endParaRPr lang="de-DE"/>
-          </a:p>
-        </p:txBody>
-      </p:sp>
-      <p:sp>
-        <p:nvSpPr>
-          <p:cNvPr id="9" name="Oval 8">
-            <a:extLst>
-              <a:ext uri="{FF2B5EF4-FFF2-40B4-BE49-F238E27FC236}">
-                <a16:creationId xmlns:a16="http://schemas.microsoft.com/office/drawing/2014/main" id="{BD36AB9B-9C75-7B45-AD50-A1B3B033511B}"/>
-              </a:ext>
-            </a:extLst>
-          </p:cNvPr>
-          <p:cNvSpPr/>
-          <p:nvPr/>
-        </p:nvSpPr>
-        <p:spPr>
-          <a:xfrm>
-            <a:off x="5465805" y="4329863"/>
-            <a:ext cx="1260390" cy="580767"/>
-          </a:xfrm>
-          <a:prstGeom prst="ellipse">
-            <a:avLst/>
-          </a:prstGeom>
-          <a:noFill/>
-          <a:ln w="25400">
-            <a:solidFill>
-              <a:srgbClr val="FF0000"/>
-            </a:solidFill>
-            <a:prstDash val="sysDot"/>
-          </a:ln>
-        </p:spPr>
-        <p:style>
-          <a:lnRef idx="2">
-            <a:schemeClr val="accent1">
-              <a:shade val="50000"/>
-            </a:schemeClr>
-          </a:lnRef>
-          <a:fillRef idx="1">
-            <a:schemeClr val="accent1"/>
-          </a:fillRef>
-          <a:effectRef idx="0">
-            <a:schemeClr val="accent1"/>
-          </a:effectRef>
-          <a:fontRef idx="minor">
-            <a:schemeClr val="lt1"/>
-          </a:fontRef>
-        </p:style>
-        <p:txBody>
-          <a:bodyPr rtlCol="0" anchor="ctr"/>
-          <a:lstStyle/>
-          <a:p>
-            <a:pPr algn="ctr"/>
-            <a:endParaRPr lang="de-DE"/>
-          </a:p>
-        </p:txBody>
-      </p:sp>
-      <p:sp>
-        <p:nvSpPr>
-          <p:cNvPr id="10" name="Oval 9">
-            <a:extLst>
-              <a:ext uri="{FF2B5EF4-FFF2-40B4-BE49-F238E27FC236}">
-                <a16:creationId xmlns:a16="http://schemas.microsoft.com/office/drawing/2014/main" id="{B8182CB0-0350-114A-B0E7-907FCFFA57A1}"/>
-              </a:ext>
-            </a:extLst>
-          </p:cNvPr>
-          <p:cNvSpPr/>
-          <p:nvPr/>
-        </p:nvSpPr>
-        <p:spPr>
-          <a:xfrm>
-            <a:off x="7574837" y="4358439"/>
-            <a:ext cx="1260390" cy="580767"/>
-          </a:xfrm>
-          <a:prstGeom prst="ellipse">
-            <a:avLst/>
-          </a:prstGeom>
-          <a:noFill/>
-          <a:ln w="25400">
-            <a:solidFill>
-              <a:srgbClr val="FF0000"/>
-            </a:solidFill>
-            <a:prstDash val="sysDot"/>
-          </a:ln>
-        </p:spPr>
-        <p:style>
-          <a:lnRef idx="2">
-            <a:schemeClr val="accent1">
-              <a:shade val="50000"/>
-            </a:schemeClr>
-          </a:lnRef>
-          <a:fillRef idx="1">
-            <a:schemeClr val="accent1"/>
-          </a:fillRef>
-          <a:effectRef idx="0">
-            <a:schemeClr val="accent1"/>
-          </a:effectRef>
-          <a:fontRef idx="minor">
-            <a:schemeClr val="lt1"/>
-          </a:fontRef>
-        </p:style>
-        <p:txBody>
-          <a:bodyPr rtlCol="0" anchor="ctr"/>
-          <a:lstStyle/>
-          <a:p>
-            <a:pPr algn="ctr"/>
-            <a:endParaRPr lang="de-DE"/>
-          </a:p>
-        </p:txBody>
-      </p:sp>
-      <p:sp>
-        <p:nvSpPr>
-          <p:cNvPr id="11" name="Oval 10">
-            <a:extLst>
-              <a:ext uri="{FF2B5EF4-FFF2-40B4-BE49-F238E27FC236}">
-                <a16:creationId xmlns:a16="http://schemas.microsoft.com/office/drawing/2014/main" id="{52D513D3-C95F-194D-B8D0-6B8CCF7B3B09}"/>
-              </a:ext>
-            </a:extLst>
-          </p:cNvPr>
-          <p:cNvSpPr/>
-          <p:nvPr/>
-        </p:nvSpPr>
-        <p:spPr>
-          <a:xfrm>
-            <a:off x="341845" y="5993820"/>
-            <a:ext cx="1260390" cy="580767"/>
-          </a:xfrm>
-          <a:prstGeom prst="ellipse">
-            <a:avLst/>
-          </a:prstGeom>
-          <a:noFill/>
-          <a:ln w="25400">
-            <a:solidFill>
-              <a:srgbClr val="FF0000"/>
-            </a:solidFill>
-            <a:prstDash val="sysDot"/>
-          </a:ln>
-        </p:spPr>
-        <p:style>
-          <a:lnRef idx="2">
-            <a:schemeClr val="accent1">
-              <a:shade val="50000"/>
-            </a:schemeClr>
-          </a:lnRef>
-          <a:fillRef idx="1">
-            <a:schemeClr val="accent1"/>
-          </a:fillRef>
-          <a:effectRef idx="0">
-            <a:schemeClr val="accent1"/>
-          </a:effectRef>
-          <a:fontRef idx="minor">
-            <a:schemeClr val="lt1"/>
-          </a:fontRef>
-        </p:style>
-        <p:txBody>
-          <a:bodyPr rtlCol="0" anchor="ctr"/>
-          <a:lstStyle/>
-          <a:p>
-            <a:pPr algn="ctr"/>
-            <a:endParaRPr lang="de-DE"/>
-          </a:p>
-        </p:txBody>
-      </p:sp>
-      <p:sp>
-        <p:nvSpPr>
-          <p:cNvPr id="12" name="Oval 11">
-            <a:extLst>
-              <a:ext uri="{FF2B5EF4-FFF2-40B4-BE49-F238E27FC236}">
-                <a16:creationId xmlns:a16="http://schemas.microsoft.com/office/drawing/2014/main" id="{74158EB9-9261-5B45-BDC5-9E58BFB1D172}"/>
-              </a:ext>
-            </a:extLst>
-          </p:cNvPr>
-          <p:cNvSpPr/>
-          <p:nvPr/>
-        </p:nvSpPr>
-        <p:spPr>
-          <a:xfrm>
-            <a:off x="2465496" y="5993820"/>
-            <a:ext cx="1260390" cy="580767"/>
-          </a:xfrm>
-          <a:prstGeom prst="ellipse">
-            <a:avLst/>
-          </a:prstGeom>
-          <a:noFill/>
-          <a:ln w="25400">
-            <a:solidFill>
-              <a:srgbClr val="FF0000"/>
-            </a:solidFill>
-            <a:prstDash val="sysDot"/>
-          </a:ln>
-        </p:spPr>
-        <p:style>
-          <a:lnRef idx="2">
-            <a:schemeClr val="accent1">
-              <a:shade val="50000"/>
-            </a:schemeClr>
-          </a:lnRef>
-          <a:fillRef idx="1">
-            <a:schemeClr val="accent1"/>
-          </a:fillRef>
-          <a:effectRef idx="0">
-            <a:schemeClr val="accent1"/>
-          </a:effectRef>
-          <a:fontRef idx="minor">
-            <a:schemeClr val="lt1"/>
-          </a:fontRef>
-        </p:style>
-        <p:txBody>
-          <a:bodyPr rtlCol="0" anchor="ctr"/>
-          <a:lstStyle/>
-          <a:p>
-            <a:pPr algn="ctr"/>
-            <a:endParaRPr lang="de-DE"/>
-          </a:p>
-        </p:txBody>
-      </p:sp>
-      <p:sp>
-        <p:nvSpPr>
-          <p:cNvPr id="13" name="Oval 12">
-            <a:extLst>
-              <a:ext uri="{FF2B5EF4-FFF2-40B4-BE49-F238E27FC236}">
-                <a16:creationId xmlns:a16="http://schemas.microsoft.com/office/drawing/2014/main" id="{CB9EC61A-E518-1747-8039-6AB5F6F6D007}"/>
-              </a:ext>
-            </a:extLst>
-          </p:cNvPr>
-          <p:cNvSpPr/>
-          <p:nvPr/>
-        </p:nvSpPr>
-        <p:spPr>
-          <a:xfrm>
-            <a:off x="373157" y="3436357"/>
-            <a:ext cx="1260390" cy="580767"/>
-          </a:xfrm>
-          <a:prstGeom prst="ellipse">
-            <a:avLst/>
-          </a:prstGeom>
-          <a:noFill/>
-          <a:ln w="25400">
-            <a:solidFill>
-              <a:srgbClr val="FF0000"/>
-            </a:solidFill>
-            <a:prstDash val="sysDot"/>
-          </a:ln>
-        </p:spPr>
-        <p:style>
-          <a:lnRef idx="2">
-            <a:schemeClr val="accent1">
-              <a:shade val="50000"/>
-            </a:schemeClr>
-          </a:lnRef>
-          <a:fillRef idx="1">
-            <a:schemeClr val="accent1"/>
-          </a:fillRef>
-          <a:effectRef idx="0">
-            <a:schemeClr val="accent1"/>
-          </a:effectRef>
-          <a:fontRef idx="minor">
-            <a:schemeClr val="lt1"/>
-          </a:fontRef>
-        </p:style>
-        <p:txBody>
-          <a:bodyPr rtlCol="0" anchor="ctr"/>
-          <a:lstStyle/>
-          <a:p>
-            <a:pPr algn="ctr"/>
-            <a:endParaRPr lang="de-DE"/>
-          </a:p>
-        </p:txBody>
-      </p:sp>
-      <p:sp>
-        <p:nvSpPr>
-          <p:cNvPr id="14" name="Oval 13">
-            <a:extLst>
-              <a:ext uri="{FF2B5EF4-FFF2-40B4-BE49-F238E27FC236}">
-                <a16:creationId xmlns:a16="http://schemas.microsoft.com/office/drawing/2014/main" id="{A9FCBF11-FE62-2446-A010-A00E26A4D8D6}"/>
-              </a:ext>
-            </a:extLst>
-          </p:cNvPr>
-          <p:cNvSpPr/>
-          <p:nvPr/>
-        </p:nvSpPr>
-        <p:spPr>
-          <a:xfrm>
-            <a:off x="2526444" y="3393564"/>
-            <a:ext cx="1260390" cy="580767"/>
-          </a:xfrm>
-          <a:prstGeom prst="ellipse">
-            <a:avLst/>
-          </a:prstGeom>
-          <a:noFill/>
-          <a:ln w="25400">
-            <a:solidFill>
-              <a:srgbClr val="FF0000"/>
-            </a:solidFill>
-            <a:prstDash val="sysDot"/>
-          </a:ln>
-        </p:spPr>
-        <p:style>
-          <a:lnRef idx="2">
-            <a:schemeClr val="accent1">
-              <a:shade val="50000"/>
-            </a:schemeClr>
-          </a:lnRef>
-          <a:fillRef idx="1">
-            <a:schemeClr val="accent1"/>
-          </a:fillRef>
-          <a:effectRef idx="0">
-            <a:schemeClr val="accent1"/>
-          </a:effectRef>
-          <a:fontRef idx="minor">
-            <a:schemeClr val="lt1"/>
-          </a:fontRef>
-        </p:style>
-        <p:txBody>
-          <a:bodyPr rtlCol="0" anchor="ctr"/>
-          <a:lstStyle/>
-          <a:p>
-            <a:pPr algn="ctr"/>
-            <a:endParaRPr lang="de-DE"/>
-          </a:p>
-        </p:txBody>
-      </p:sp>
-      <p:sp>
-        <p:nvSpPr>
-          <p:cNvPr id="15" name="Oval 14">
-            <a:extLst>
-              <a:ext uri="{FF2B5EF4-FFF2-40B4-BE49-F238E27FC236}">
-                <a16:creationId xmlns:a16="http://schemas.microsoft.com/office/drawing/2014/main" id="{D56DBB79-26FD-5C45-8DFF-FAF9D7ED3383}"/>
-              </a:ext>
-            </a:extLst>
-          </p:cNvPr>
-          <p:cNvSpPr/>
-          <p:nvPr/>
-        </p:nvSpPr>
-        <p:spPr>
-          <a:xfrm>
-            <a:off x="9763085" y="1665128"/>
-            <a:ext cx="1260390" cy="580767"/>
-          </a:xfrm>
-          <a:prstGeom prst="ellipse">
-            <a:avLst/>
-          </a:prstGeom>
-          <a:noFill/>
-          <a:ln w="25400">
-            <a:solidFill>
-              <a:srgbClr val="FF0000"/>
-            </a:solidFill>
-            <a:prstDash val="sysDot"/>
-          </a:ln>
-        </p:spPr>
-        <p:style>
-          <a:lnRef idx="2">
-            <a:schemeClr val="accent1">
-              <a:shade val="50000"/>
-            </a:schemeClr>
-          </a:lnRef>
-          <a:fillRef idx="1">
-            <a:schemeClr val="accent1"/>
-          </a:fillRef>
-          <a:effectRef idx="0">
-            <a:schemeClr val="accent1"/>
-          </a:effectRef>
-          <a:fontRef idx="minor">
-            <a:schemeClr val="lt1"/>
-          </a:fontRef>
-        </p:style>
-        <p:txBody>
-          <a:bodyPr rtlCol="0" anchor="ctr"/>
-          <a:lstStyle/>
-          <a:p>
-            <a:pPr algn="ctr"/>
-            <a:endParaRPr lang="de-DE"/>
-          </a:p>
-        </p:txBody>
-      </p:sp>
-      <p:sp>
-        <p:nvSpPr>
-          <p:cNvPr id="16" name="Oval 15">
-            <a:extLst>
-              <a:ext uri="{FF2B5EF4-FFF2-40B4-BE49-F238E27FC236}">
-                <a16:creationId xmlns:a16="http://schemas.microsoft.com/office/drawing/2014/main" id="{F9E7C157-8AF7-FD42-87CD-AD91D8D1BE0E}"/>
-              </a:ext>
-            </a:extLst>
-          </p:cNvPr>
-          <p:cNvSpPr/>
-          <p:nvPr/>
-        </p:nvSpPr>
-        <p:spPr>
-          <a:xfrm>
-            <a:off x="9638442" y="4321722"/>
-            <a:ext cx="1260390" cy="580767"/>
-          </a:xfrm>
-          <a:prstGeom prst="ellipse">
-            <a:avLst/>
-          </a:prstGeom>
-          <a:noFill/>
-          <a:ln w="25400">
-            <a:solidFill>
-              <a:srgbClr val="FF0000"/>
-            </a:solidFill>
-            <a:prstDash val="sysDot"/>
-          </a:ln>
-        </p:spPr>
-        <p:style>
-          <a:lnRef idx="2">
-            <a:schemeClr val="accent1">
-              <a:shade val="50000"/>
-            </a:schemeClr>
-          </a:lnRef>
-          <a:fillRef idx="1">
-            <a:schemeClr val="accent1"/>
-          </a:fillRef>
-          <a:effectRef idx="0">
-            <a:schemeClr val="accent1"/>
-          </a:effectRef>
-          <a:fontRef idx="minor">
-            <a:schemeClr val="lt1"/>
-          </a:fontRef>
-        </p:style>
-        <p:txBody>
-          <a:bodyPr rtlCol="0" anchor="ctr"/>
-          <a:lstStyle/>
-          <a:p>
-            <a:pPr algn="ctr"/>
-            <a:endParaRPr lang="de-DE"/>
-          </a:p>
-        </p:txBody>
-      </p:sp>
-      <p:sp>
-        <p:nvSpPr>
-          <p:cNvPr id="17" name="Textfeld 16">
-            <a:extLst>
-              <a:ext uri="{FF2B5EF4-FFF2-40B4-BE49-F238E27FC236}">
-                <a16:creationId xmlns:a16="http://schemas.microsoft.com/office/drawing/2014/main" id="{5097CE70-2AE0-1F47-A386-CFA4F6F26EC6}"/>
-              </a:ext>
-            </a:extLst>
-          </p:cNvPr>
-          <p:cNvSpPr txBox="1"/>
-          <p:nvPr/>
-        </p:nvSpPr>
-        <p:spPr>
-          <a:xfrm>
-            <a:off x="5946501" y="582918"/>
-            <a:ext cx="5755546" cy="400110"/>
-          </a:xfrm>
-          <a:prstGeom prst="rect">
-            <a:avLst/>
-          </a:prstGeom>
-          <a:solidFill>
-            <a:schemeClr val="bg2"/>
-          </a:solidFill>
-        </p:spPr>
-        <p:txBody>
-          <a:bodyPr wrap="square" rtlCol="0">
-            <a:spAutoFit/>
-          </a:bodyPr>
-          <a:lstStyle/>
-          <a:p>
-            <a:r>
-              <a:rPr lang="de-DE" sz="2000">
-                <a:solidFill>
-                  <a:srgbClr val="FF0000"/>
-                </a:solidFill>
-                <a:sym typeface="Wingdings" pitchFamily="2" charset="2"/>
-              </a:rPr>
-              <a:t> Works fine for </a:t>
-            </a:r>
-            <a:r>
-              <a:rPr lang="de-DE" sz="2000" b="1">
-                <a:solidFill>
-                  <a:srgbClr val="FF0000"/>
-                </a:solidFill>
-                <a:sym typeface="Wingdings" pitchFamily="2" charset="2"/>
-              </a:rPr>
-              <a:t>short target length </a:t>
-            </a:r>
-            <a:r>
-              <a:rPr lang="de-DE" sz="2000">
-                <a:solidFill>
-                  <a:srgbClr val="FF0000"/>
-                </a:solidFill>
-                <a:sym typeface="Wingdings" pitchFamily="2" charset="2"/>
-              </a:rPr>
-              <a:t>up to 3 months</a:t>
-            </a:r>
-            <a:r>
-              <a:rPr lang="de-DE" sz="2000">
-                <a:solidFill>
-                  <a:srgbClr val="FF0000"/>
-                </a:solidFill>
-              </a:rPr>
-              <a:t>!</a:t>
-            </a:r>
-          </a:p>
-        </p:txBody>
-      </p:sp>
     </p:spTree>
     <p:extLst>
       <p:ext uri="{BB962C8B-B14F-4D97-AF65-F5344CB8AC3E}">
-        <p14:creationId xmlns:p14="http://schemas.microsoft.com/office/powerpoint/2010/main" val="1402861701"/>
+        <p14:creationId xmlns:p14="http://schemas.microsoft.com/office/powerpoint/2010/main" val="641560152"/>
       </p:ext>
     </p:extLst>
   </p:cSld>

</xml_diff>